<commit_message>
FDIOS-543: Removing personal information from the document templates
</commit_message>
<xml_diff>
--- a/Resources-Branding/Shared/Templates/Template.pptx
+++ b/Resources-Branding/Shared/Templates/Template.pptx
@@ -328,7 +328,7 @@
               <a:pPr>
                 <a:defRPr/>
               </a:pPr>
-              <a:t>7/24/12</a:t>
+              <a:t>7/25/12</a:t>
             </a:fld>
             <a:endParaRPr lang="es-ES"/>
           </a:p>
@@ -525,7 +525,7 @@
               <a:pPr>
                 <a:defRPr/>
               </a:pPr>
-              <a:t>7/24/12</a:t>
+              <a:t>7/25/12</a:t>
             </a:fld>
             <a:endParaRPr lang="es-ES"/>
           </a:p>
@@ -732,7 +732,7 @@
               <a:pPr>
                 <a:defRPr/>
               </a:pPr>
-              <a:t>7/24/12</a:t>
+              <a:t>7/25/12</a:t>
             </a:fld>
             <a:endParaRPr lang="es-ES"/>
           </a:p>
@@ -929,7 +929,7 @@
               <a:pPr>
                 <a:defRPr/>
               </a:pPr>
-              <a:t>7/24/12</a:t>
+              <a:t>7/25/12</a:t>
             </a:fld>
             <a:endParaRPr lang="es-ES"/>
           </a:p>
@@ -1202,7 +1202,7 @@
               <a:pPr>
                 <a:defRPr/>
               </a:pPr>
-              <a:t>7/24/12</a:t>
+              <a:t>7/25/12</a:t>
             </a:fld>
             <a:endParaRPr lang="es-ES"/>
           </a:p>
@@ -1517,7 +1517,7 @@
               <a:pPr>
                 <a:defRPr/>
               </a:pPr>
-              <a:t>7/24/12</a:t>
+              <a:t>7/25/12</a:t>
             </a:fld>
             <a:endParaRPr lang="es-ES"/>
           </a:p>
@@ -1966,7 +1966,7 @@
               <a:pPr>
                 <a:defRPr/>
               </a:pPr>
-              <a:t>7/24/12</a:t>
+              <a:t>7/25/12</a:t>
             </a:fld>
             <a:endParaRPr lang="es-ES"/>
           </a:p>
@@ -2111,7 +2111,7 @@
               <a:pPr>
                 <a:defRPr/>
               </a:pPr>
-              <a:t>7/24/12</a:t>
+              <a:t>7/25/12</a:t>
             </a:fld>
             <a:endParaRPr lang="es-ES"/>
           </a:p>
@@ -2233,7 +2233,7 @@
               <a:pPr>
                 <a:defRPr/>
               </a:pPr>
-              <a:t>7/24/12</a:t>
+              <a:t>7/25/12</a:t>
             </a:fld>
             <a:endParaRPr lang="es-ES"/>
           </a:p>
@@ -2537,7 +2537,7 @@
               <a:pPr>
                 <a:defRPr/>
               </a:pPr>
-              <a:t>7/24/12</a:t>
+              <a:t>7/25/12</a:t>
             </a:fld>
             <a:endParaRPr lang="es-ES"/>
           </a:p>
@@ -2820,7 +2820,7 @@
               <a:pPr>
                 <a:defRPr/>
               </a:pPr>
-              <a:t>7/24/12</a:t>
+              <a:t>7/25/12</a:t>
             </a:fld>
             <a:endParaRPr lang="es-ES"/>
           </a:p>
@@ -3122,7 +3122,7 @@
               <a:pPr>
                 <a:defRPr/>
               </a:pPr>
-              <a:t>7/24/12</a:t>
+              <a:t>7/25/12</a:t>
             </a:fld>
             <a:endParaRPr lang="es-ES"/>
           </a:p>

</xml_diff>

<commit_message>
IOSAPP14-25 Removed unneeded Template.rtf file and rescrubbed Office document metadata using Office 2010 on Windows
</commit_message>
<xml_diff>
--- a/Resources-Branding/Shared/Templates/Template.pptx
+++ b/Resources-Branding/Shared/Templates/Template.pptx
@@ -1,136 +1,103 @@
 
 <file path=ppt/presentation.xml><?xml version="1.0" encoding="utf-8"?>
-<p:presentation xmlns:a="http://schemas.openxmlformats.org/drawingml/2006/main" xmlns:r="http://schemas.openxmlformats.org/officeDocument/2006/relationships" xmlns:p="http://schemas.openxmlformats.org/presentationml/2006/main" saveSubsetFonts="1" autoCompressPictures="0">
+<p:presentation xmlns:a="http://schemas.openxmlformats.org/drawingml/2006/main" xmlns:r="http://schemas.openxmlformats.org/officeDocument/2006/relationships" xmlns:p="http://schemas.openxmlformats.org/presentationml/2006/main" saveSubsetFonts="1">
   <p:sldMasterIdLst>
     <p:sldMasterId id="2147483648" r:id="rId1"/>
   </p:sldMasterIdLst>
-  <p:sldIdLst>
-    <p:sldId id="256" r:id="rId2"/>
-  </p:sldIdLst>
   <p:sldSz cx="9144000" cy="6858000" type="screen4x3"/>
   <p:notesSz cx="6858000" cy="9144000"/>
   <p:defaultTextStyle>
     <a:defPPr>
-      <a:defRPr lang="es-ES"/>
+      <a:defRPr lang="en-US"/>
     </a:defPPr>
-    <a:lvl1pPr algn="l" defTabSz="457200" rtl="0" fontAlgn="base">
-      <a:spcBef>
-        <a:spcPct val="0"/>
-      </a:spcBef>
-      <a:spcAft>
-        <a:spcPct val="0"/>
-      </a:spcAft>
-      <a:defRPr kern="1200">
+    <a:lvl1pPr marL="0" algn="l" defTabSz="914400" rtl="0" eaLnBrk="1" latinLnBrk="0" hangingPunct="1">
+      <a:defRPr sz="1800" kern="1200">
         <a:solidFill>
           <a:schemeClr val="tx1"/>
         </a:solidFill>
-        <a:latin typeface="Calibri" charset="0"/>
-        <a:ea typeface="ＭＳ Ｐゴシック" charset="0"/>
-        <a:cs typeface="ＭＳ Ｐゴシック" charset="0"/>
+        <a:latin typeface="+mn-lt"/>
+        <a:ea typeface="+mn-ea"/>
+        <a:cs typeface="+mn-cs"/>
       </a:defRPr>
     </a:lvl1pPr>
-    <a:lvl2pPr marL="457200" algn="l" defTabSz="457200" rtl="0" fontAlgn="base">
-      <a:spcBef>
-        <a:spcPct val="0"/>
-      </a:spcBef>
-      <a:spcAft>
-        <a:spcPct val="0"/>
-      </a:spcAft>
-      <a:defRPr kern="1200">
+    <a:lvl2pPr marL="457200" algn="l" defTabSz="914400" rtl="0" eaLnBrk="1" latinLnBrk="0" hangingPunct="1">
+      <a:defRPr sz="1800" kern="1200">
         <a:solidFill>
           <a:schemeClr val="tx1"/>
         </a:solidFill>
-        <a:latin typeface="Calibri" charset="0"/>
-        <a:ea typeface="ＭＳ Ｐゴシック" charset="0"/>
-        <a:cs typeface="ＭＳ Ｐゴシック" charset="0"/>
+        <a:latin typeface="+mn-lt"/>
+        <a:ea typeface="+mn-ea"/>
+        <a:cs typeface="+mn-cs"/>
       </a:defRPr>
     </a:lvl2pPr>
-    <a:lvl3pPr marL="914400" algn="l" defTabSz="457200" rtl="0" fontAlgn="base">
-      <a:spcBef>
-        <a:spcPct val="0"/>
-      </a:spcBef>
-      <a:spcAft>
-        <a:spcPct val="0"/>
-      </a:spcAft>
-      <a:defRPr kern="1200">
+    <a:lvl3pPr marL="914400" algn="l" defTabSz="914400" rtl="0" eaLnBrk="1" latinLnBrk="0" hangingPunct="1">
+      <a:defRPr sz="1800" kern="1200">
         <a:solidFill>
           <a:schemeClr val="tx1"/>
         </a:solidFill>
-        <a:latin typeface="Calibri" charset="0"/>
-        <a:ea typeface="ＭＳ Ｐゴシック" charset="0"/>
-        <a:cs typeface="ＭＳ Ｐゴシック" charset="0"/>
+        <a:latin typeface="+mn-lt"/>
+        <a:ea typeface="+mn-ea"/>
+        <a:cs typeface="+mn-cs"/>
       </a:defRPr>
     </a:lvl3pPr>
-    <a:lvl4pPr marL="1371600" algn="l" defTabSz="457200" rtl="0" fontAlgn="base">
-      <a:spcBef>
-        <a:spcPct val="0"/>
-      </a:spcBef>
-      <a:spcAft>
-        <a:spcPct val="0"/>
-      </a:spcAft>
-      <a:defRPr kern="1200">
+    <a:lvl4pPr marL="1371600" algn="l" defTabSz="914400" rtl="0" eaLnBrk="1" latinLnBrk="0" hangingPunct="1">
+      <a:defRPr sz="1800" kern="1200">
         <a:solidFill>
           <a:schemeClr val="tx1"/>
         </a:solidFill>
-        <a:latin typeface="Calibri" charset="0"/>
-        <a:ea typeface="ＭＳ Ｐゴシック" charset="0"/>
-        <a:cs typeface="ＭＳ Ｐゴシック" charset="0"/>
+        <a:latin typeface="+mn-lt"/>
+        <a:ea typeface="+mn-ea"/>
+        <a:cs typeface="+mn-cs"/>
       </a:defRPr>
     </a:lvl4pPr>
-    <a:lvl5pPr marL="1828800" algn="l" defTabSz="457200" rtl="0" fontAlgn="base">
-      <a:spcBef>
-        <a:spcPct val="0"/>
-      </a:spcBef>
-      <a:spcAft>
-        <a:spcPct val="0"/>
-      </a:spcAft>
-      <a:defRPr kern="1200">
+    <a:lvl5pPr marL="1828800" algn="l" defTabSz="914400" rtl="0" eaLnBrk="1" latinLnBrk="0" hangingPunct="1">
+      <a:defRPr sz="1800" kern="1200">
         <a:solidFill>
           <a:schemeClr val="tx1"/>
         </a:solidFill>
-        <a:latin typeface="Calibri" charset="0"/>
-        <a:ea typeface="ＭＳ Ｐゴシック" charset="0"/>
-        <a:cs typeface="ＭＳ Ｐゴシック" charset="0"/>
+        <a:latin typeface="+mn-lt"/>
+        <a:ea typeface="+mn-ea"/>
+        <a:cs typeface="+mn-cs"/>
       </a:defRPr>
     </a:lvl5pPr>
-    <a:lvl6pPr marL="2286000" algn="l" defTabSz="457200" rtl="0" eaLnBrk="1" latinLnBrk="0" hangingPunct="1">
-      <a:defRPr kern="1200">
+    <a:lvl6pPr marL="2286000" algn="l" defTabSz="914400" rtl="0" eaLnBrk="1" latinLnBrk="0" hangingPunct="1">
+      <a:defRPr sz="1800" kern="1200">
         <a:solidFill>
           <a:schemeClr val="tx1"/>
         </a:solidFill>
-        <a:latin typeface="Calibri" charset="0"/>
-        <a:ea typeface="ＭＳ Ｐゴシック" charset="0"/>
-        <a:cs typeface="ＭＳ Ｐゴシック" charset="0"/>
+        <a:latin typeface="+mn-lt"/>
+        <a:ea typeface="+mn-ea"/>
+        <a:cs typeface="+mn-cs"/>
       </a:defRPr>
     </a:lvl6pPr>
-    <a:lvl7pPr marL="2743200" algn="l" defTabSz="457200" rtl="0" eaLnBrk="1" latinLnBrk="0" hangingPunct="1">
-      <a:defRPr kern="1200">
+    <a:lvl7pPr marL="2743200" algn="l" defTabSz="914400" rtl="0" eaLnBrk="1" latinLnBrk="0" hangingPunct="1">
+      <a:defRPr sz="1800" kern="1200">
         <a:solidFill>
           <a:schemeClr val="tx1"/>
         </a:solidFill>
-        <a:latin typeface="Calibri" charset="0"/>
-        <a:ea typeface="ＭＳ Ｐゴシック" charset="0"/>
-        <a:cs typeface="ＭＳ Ｐゴシック" charset="0"/>
+        <a:latin typeface="+mn-lt"/>
+        <a:ea typeface="+mn-ea"/>
+        <a:cs typeface="+mn-cs"/>
       </a:defRPr>
     </a:lvl7pPr>
-    <a:lvl8pPr marL="3200400" algn="l" defTabSz="457200" rtl="0" eaLnBrk="1" latinLnBrk="0" hangingPunct="1">
-      <a:defRPr kern="1200">
+    <a:lvl8pPr marL="3200400" algn="l" defTabSz="914400" rtl="0" eaLnBrk="1" latinLnBrk="0" hangingPunct="1">
+      <a:defRPr sz="1800" kern="1200">
         <a:solidFill>
           <a:schemeClr val="tx1"/>
         </a:solidFill>
-        <a:latin typeface="Calibri" charset="0"/>
-        <a:ea typeface="ＭＳ Ｐゴシック" charset="0"/>
-        <a:cs typeface="ＭＳ Ｐゴシック" charset="0"/>
+        <a:latin typeface="+mn-lt"/>
+        <a:ea typeface="+mn-ea"/>
+        <a:cs typeface="+mn-cs"/>
       </a:defRPr>
     </a:lvl8pPr>
-    <a:lvl9pPr marL="3657600" algn="l" defTabSz="457200" rtl="0" eaLnBrk="1" latinLnBrk="0" hangingPunct="1">
-      <a:defRPr kern="1200">
+    <a:lvl9pPr marL="3657600" algn="l" defTabSz="914400" rtl="0" eaLnBrk="1" latinLnBrk="0" hangingPunct="1">
+      <a:defRPr sz="1800" kern="1200">
         <a:solidFill>
           <a:schemeClr val="tx1"/>
         </a:solidFill>
-        <a:latin typeface="Calibri" charset="0"/>
-        <a:ea typeface="ＭＳ Ｐゴシック" charset="0"/>
-        <a:cs typeface="ＭＳ Ｐゴシック" charset="0"/>
+        <a:latin typeface="+mn-lt"/>
+        <a:ea typeface="+mn-ea"/>
+        <a:cs typeface="+mn-cs"/>
       </a:defRPr>
     </a:lvl9pPr>
   </p:defaultTextStyle>
@@ -139,7 +106,7 @@
 
 <file path=ppt/slideLayouts/slideLayout1.xml><?xml version="1.0" encoding="utf-8"?>
 <p:sldLayout xmlns:a="http://schemas.openxmlformats.org/drawingml/2006/main" xmlns:r="http://schemas.openxmlformats.org/officeDocument/2006/relationships" xmlns:p="http://schemas.openxmlformats.org/presentationml/2006/main" type="title" preserve="1">
-  <p:cSld name="Diapositiva de título">
+  <p:cSld name="Title Slide">
     <p:spTree>
       <p:nvGrpSpPr>
         <p:cNvPr id="1" name=""/>
@@ -156,7 +123,7 @@
       </p:grpSpPr>
       <p:sp>
         <p:nvSpPr>
-          <p:cNvPr id="2" name="Título 1"/>
+          <p:cNvPr id="2" name="Title 1"/>
           <p:cNvSpPr>
             <a:spLocks noGrp="1"/>
           </p:cNvSpPr>
@@ -176,15 +143,15 @@
           <a:p>
             <a:r>
               <a:rPr lang="en-US" smtClean="0"/>
-              <a:t>Clic para editar título</a:t>
-            </a:r>
-            <a:endParaRPr lang="es-ES"/>
-          </a:p>
-        </p:txBody>
-      </p:sp>
-      <p:sp>
-        <p:nvSpPr>
-          <p:cNvPr id="3" name="Subtítulo 2"/>
+              <a:t>Click to edit Master title style</a:t>
+            </a:r>
+            <a:endParaRPr lang="en-US"/>
+          </a:p>
+        </p:txBody>
+      </p:sp>
+      <p:sp>
+        <p:nvSpPr>
+          <p:cNvPr id="3" name="Subtitle 2"/>
           <p:cNvSpPr>
             <a:spLocks noGrp="1"/>
           </p:cNvSpPr>
@@ -295,15 +262,15 @@
           <a:p>
             <a:r>
               <a:rPr lang="en-US" smtClean="0"/>
-              <a:t>Haga clic para modificar el estilo de subtítulo del patrón</a:t>
-            </a:r>
-            <a:endParaRPr lang="es-ES"/>
-          </a:p>
-        </p:txBody>
-      </p:sp>
-      <p:sp>
-        <p:nvSpPr>
-          <p:cNvPr id="4" name="Marcador de fecha 3"/>
+              <a:t>Click to edit Master subtitle style</a:t>
+            </a:r>
+            <a:endParaRPr lang="en-US"/>
+          </a:p>
+        </p:txBody>
+      </p:sp>
+      <p:sp>
+        <p:nvSpPr>
+          <p:cNvPr id="4" name="Date Placeholder 3"/>
           <p:cNvSpPr>
             <a:spLocks noGrp="1"/>
           </p:cNvSpPr>
@@ -314,29 +281,20 @@
         <p:spPr/>
         <p:txBody>
           <a:bodyPr/>
-          <a:lstStyle>
-            <a:lvl1pPr>
-              <a:defRPr/>
-            </a:lvl1pPr>
-          </a:lstStyle>
-          <a:p>
-            <a:pPr>
-              <a:defRPr/>
-            </a:pPr>
-            <a:fld id="{286C09A2-9ABA-E84D-9DE1-AE8522D60DC8}" type="datetimeFigureOut">
-              <a:rPr lang="es-ES"/>
-              <a:pPr>
-                <a:defRPr/>
-              </a:pPr>
-              <a:t>7/25/12</a:t>
+          <a:lstStyle/>
+          <a:p>
+            <a:fld id="{1D8BD707-D9CF-40AE-B4C6-C98DA3205C09}" type="datetimeFigureOut">
+              <a:rPr lang="en-US" smtClean="0"/>
+              <a:pPr/>
+              <a:t>9/18/2006</a:t>
             </a:fld>
-            <a:endParaRPr lang="es-ES"/>
-          </a:p>
-        </p:txBody>
-      </p:sp>
-      <p:sp>
-        <p:nvSpPr>
-          <p:cNvPr id="5" name="Marcador de pie de página 4"/>
+            <a:endParaRPr lang="en-US"/>
+          </a:p>
+        </p:txBody>
+      </p:sp>
+      <p:sp>
+        <p:nvSpPr>
+          <p:cNvPr id="5" name="Footer Placeholder 4"/>
           <p:cNvSpPr>
             <a:spLocks noGrp="1"/>
           </p:cNvSpPr>
@@ -347,22 +305,15 @@
         <p:spPr/>
         <p:txBody>
           <a:bodyPr/>
-          <a:lstStyle>
-            <a:lvl1pPr>
-              <a:defRPr/>
-            </a:lvl1pPr>
-          </a:lstStyle>
-          <a:p>
-            <a:pPr>
-              <a:defRPr/>
-            </a:pPr>
-            <a:endParaRPr lang="es-ES"/>
-          </a:p>
-        </p:txBody>
-      </p:sp>
-      <p:sp>
-        <p:nvSpPr>
-          <p:cNvPr id="6" name="Marcador de número de diapositiva 5"/>
+          <a:lstStyle/>
+          <a:p>
+            <a:endParaRPr lang="en-US"/>
+          </a:p>
+        </p:txBody>
+      </p:sp>
+      <p:sp>
+        <p:nvSpPr>
+          <p:cNvPr id="6" name="Slide Number Placeholder 5"/>
           <p:cNvSpPr>
             <a:spLocks noGrp="1"/>
           </p:cNvSpPr>
@@ -373,32 +324,18 @@
         <p:spPr/>
         <p:txBody>
           <a:bodyPr/>
-          <a:lstStyle>
-            <a:lvl1pPr>
-              <a:defRPr/>
-            </a:lvl1pPr>
-          </a:lstStyle>
-          <a:p>
-            <a:pPr>
-              <a:defRPr/>
-            </a:pPr>
-            <a:fld id="{A3BF6D96-4A32-3B4E-BA81-7029D21F9EDE}" type="slidenum">
-              <a:rPr lang="es-ES"/>
-              <a:pPr>
-                <a:defRPr/>
-              </a:pPr>
-              <a:t>‹Nr.›</a:t>
+          <a:lstStyle/>
+          <a:p>
+            <a:fld id="{B6F15528-21DE-4FAA-801E-634DDDAF4B2B}" type="slidenum">
+              <a:rPr lang="en-US" smtClean="0"/>
+              <a:pPr/>
+              <a:t>‹#›</a:t>
             </a:fld>
-            <a:endParaRPr lang="es-ES"/>
+            <a:endParaRPr lang="en-US"/>
           </a:p>
         </p:txBody>
       </p:sp>
     </p:spTree>
-    <p:extLst>
-      <p:ext uri="{BB962C8B-B14F-4D97-AF65-F5344CB8AC3E}">
-        <p14:creationId xmlns:p14="http://schemas.microsoft.com/office/powerpoint/2010/main" val="2016505151"/>
-      </p:ext>
-    </p:extLst>
   </p:cSld>
   <p:clrMapOvr>
     <a:masterClrMapping/>
@@ -408,7 +345,7 @@
 
 <file path=ppt/slideLayouts/slideLayout10.xml><?xml version="1.0" encoding="utf-8"?>
 <p:sldLayout xmlns:a="http://schemas.openxmlformats.org/drawingml/2006/main" xmlns:r="http://schemas.openxmlformats.org/officeDocument/2006/relationships" xmlns:p="http://schemas.openxmlformats.org/presentationml/2006/main" type="vertTx" preserve="1">
-  <p:cSld name="Título y texto vertical">
+  <p:cSld name="Title and Vertical Text">
     <p:spTree>
       <p:nvGrpSpPr>
         <p:cNvPr id="1" name=""/>
@@ -425,7 +362,7 @@
       </p:grpSpPr>
       <p:sp>
         <p:nvSpPr>
-          <p:cNvPr id="2" name="Título 1"/>
+          <p:cNvPr id="2" name="Title 1"/>
           <p:cNvSpPr>
             <a:spLocks noGrp="1"/>
           </p:cNvSpPr>
@@ -440,15 +377,15 @@
           <a:p>
             <a:r>
               <a:rPr lang="en-US" smtClean="0"/>
-              <a:t>Clic para editar título</a:t>
-            </a:r>
-            <a:endParaRPr lang="es-ES"/>
-          </a:p>
-        </p:txBody>
-      </p:sp>
-      <p:sp>
-        <p:nvSpPr>
-          <p:cNvPr id="3" name="Marcador de texto vertical 2"/>
+              <a:t>Click to edit Master title style</a:t>
+            </a:r>
+            <a:endParaRPr lang="en-US"/>
+          </a:p>
+        </p:txBody>
+      </p:sp>
+      <p:sp>
+        <p:nvSpPr>
+          <p:cNvPr id="3" name="Vertical Text Placeholder 2"/>
           <p:cNvSpPr>
             <a:spLocks noGrp="1"/>
           </p:cNvSpPr>
@@ -464,43 +401,43 @@
             <a:pPr lvl="0"/>
             <a:r>
               <a:rPr lang="en-US" smtClean="0"/>
-              <a:t>Haga clic para modificar el estilo de texto del patrón</a:t>
+              <a:t>Click to edit Master text styles</a:t>
             </a:r>
           </a:p>
           <a:p>
             <a:pPr lvl="1"/>
             <a:r>
               <a:rPr lang="en-US" smtClean="0"/>
-              <a:t>Segundo nivel</a:t>
+              <a:t>Second level</a:t>
             </a:r>
           </a:p>
           <a:p>
             <a:pPr lvl="2"/>
             <a:r>
               <a:rPr lang="en-US" smtClean="0"/>
-              <a:t>Tercer nivel</a:t>
+              <a:t>Third level</a:t>
             </a:r>
           </a:p>
           <a:p>
             <a:pPr lvl="3"/>
             <a:r>
               <a:rPr lang="en-US" smtClean="0"/>
-              <a:t>Cuarto nivel</a:t>
+              <a:t>Fourth level</a:t>
             </a:r>
           </a:p>
           <a:p>
             <a:pPr lvl="4"/>
             <a:r>
               <a:rPr lang="en-US" smtClean="0"/>
-              <a:t>Quinto nivel</a:t>
-            </a:r>
-            <a:endParaRPr lang="es-ES"/>
-          </a:p>
-        </p:txBody>
-      </p:sp>
-      <p:sp>
-        <p:nvSpPr>
-          <p:cNvPr id="4" name="Marcador de fecha 3"/>
+              <a:t>Fifth level</a:t>
+            </a:r>
+            <a:endParaRPr lang="en-US"/>
+          </a:p>
+        </p:txBody>
+      </p:sp>
+      <p:sp>
+        <p:nvSpPr>
+          <p:cNvPr id="4" name="Date Placeholder 3"/>
           <p:cNvSpPr>
             <a:spLocks noGrp="1"/>
           </p:cNvSpPr>
@@ -511,29 +448,20 @@
         <p:spPr/>
         <p:txBody>
           <a:bodyPr/>
-          <a:lstStyle>
-            <a:lvl1pPr>
-              <a:defRPr/>
-            </a:lvl1pPr>
-          </a:lstStyle>
-          <a:p>
-            <a:pPr>
-              <a:defRPr/>
-            </a:pPr>
-            <a:fld id="{F6FDC485-4545-F24E-B778-870B24E5C08F}" type="datetimeFigureOut">
-              <a:rPr lang="es-ES"/>
-              <a:pPr>
-                <a:defRPr/>
-              </a:pPr>
-              <a:t>7/25/12</a:t>
+          <a:lstStyle/>
+          <a:p>
+            <a:fld id="{1D8BD707-D9CF-40AE-B4C6-C98DA3205C09}" type="datetimeFigureOut">
+              <a:rPr lang="en-US" smtClean="0"/>
+              <a:pPr/>
+              <a:t>9/18/2006</a:t>
             </a:fld>
-            <a:endParaRPr lang="es-ES"/>
-          </a:p>
-        </p:txBody>
-      </p:sp>
-      <p:sp>
-        <p:nvSpPr>
-          <p:cNvPr id="5" name="Marcador de pie de página 4"/>
+            <a:endParaRPr lang="en-US"/>
+          </a:p>
+        </p:txBody>
+      </p:sp>
+      <p:sp>
+        <p:nvSpPr>
+          <p:cNvPr id="5" name="Footer Placeholder 4"/>
           <p:cNvSpPr>
             <a:spLocks noGrp="1"/>
           </p:cNvSpPr>
@@ -544,22 +472,15 @@
         <p:spPr/>
         <p:txBody>
           <a:bodyPr/>
-          <a:lstStyle>
-            <a:lvl1pPr>
-              <a:defRPr/>
-            </a:lvl1pPr>
-          </a:lstStyle>
-          <a:p>
-            <a:pPr>
-              <a:defRPr/>
-            </a:pPr>
-            <a:endParaRPr lang="es-ES"/>
-          </a:p>
-        </p:txBody>
-      </p:sp>
-      <p:sp>
-        <p:nvSpPr>
-          <p:cNvPr id="6" name="Marcador de número de diapositiva 5"/>
+          <a:lstStyle/>
+          <a:p>
+            <a:endParaRPr lang="en-US"/>
+          </a:p>
+        </p:txBody>
+      </p:sp>
+      <p:sp>
+        <p:nvSpPr>
+          <p:cNvPr id="6" name="Slide Number Placeholder 5"/>
           <p:cNvSpPr>
             <a:spLocks noGrp="1"/>
           </p:cNvSpPr>
@@ -570,32 +491,18 @@
         <p:spPr/>
         <p:txBody>
           <a:bodyPr/>
-          <a:lstStyle>
-            <a:lvl1pPr>
-              <a:defRPr/>
-            </a:lvl1pPr>
-          </a:lstStyle>
-          <a:p>
-            <a:pPr>
-              <a:defRPr/>
-            </a:pPr>
-            <a:fld id="{658D2AF6-2F4E-B14E-BD9E-764313B91A7A}" type="slidenum">
-              <a:rPr lang="es-ES"/>
-              <a:pPr>
-                <a:defRPr/>
-              </a:pPr>
-              <a:t>‹Nr.›</a:t>
+          <a:lstStyle/>
+          <a:p>
+            <a:fld id="{B6F15528-21DE-4FAA-801E-634DDDAF4B2B}" type="slidenum">
+              <a:rPr lang="en-US" smtClean="0"/>
+              <a:pPr/>
+              <a:t>‹#›</a:t>
             </a:fld>
-            <a:endParaRPr lang="es-ES"/>
+            <a:endParaRPr lang="en-US"/>
           </a:p>
         </p:txBody>
       </p:sp>
     </p:spTree>
-    <p:extLst>
-      <p:ext uri="{BB962C8B-B14F-4D97-AF65-F5344CB8AC3E}">
-        <p14:creationId xmlns:p14="http://schemas.microsoft.com/office/powerpoint/2010/main" val="1607025052"/>
-      </p:ext>
-    </p:extLst>
   </p:cSld>
   <p:clrMapOvr>
     <a:masterClrMapping/>
@@ -605,7 +512,7 @@
 
 <file path=ppt/slideLayouts/slideLayout11.xml><?xml version="1.0" encoding="utf-8"?>
 <p:sldLayout xmlns:a="http://schemas.openxmlformats.org/drawingml/2006/main" xmlns:r="http://schemas.openxmlformats.org/officeDocument/2006/relationships" xmlns:p="http://schemas.openxmlformats.org/presentationml/2006/main" type="vertTitleAndTx" preserve="1">
-  <p:cSld name="Título vertical y texto">
+  <p:cSld name="Vertical Title and Text">
     <p:spTree>
       <p:nvGrpSpPr>
         <p:cNvPr id="1" name=""/>
@@ -622,7 +529,7 @@
       </p:grpSpPr>
       <p:sp>
         <p:nvSpPr>
-          <p:cNvPr id="2" name="Título vertical 1"/>
+          <p:cNvPr id="2" name="Vertical Title 1"/>
           <p:cNvSpPr>
             <a:spLocks noGrp="1"/>
           </p:cNvSpPr>
@@ -642,15 +549,15 @@
           <a:p>
             <a:r>
               <a:rPr lang="en-US" smtClean="0"/>
-              <a:t>Clic para editar título</a:t>
-            </a:r>
-            <a:endParaRPr lang="es-ES"/>
-          </a:p>
-        </p:txBody>
-      </p:sp>
-      <p:sp>
-        <p:nvSpPr>
-          <p:cNvPr id="3" name="Marcador de texto vertical 2"/>
+              <a:t>Click to edit Master title style</a:t>
+            </a:r>
+            <a:endParaRPr lang="en-US"/>
+          </a:p>
+        </p:txBody>
+      </p:sp>
+      <p:sp>
+        <p:nvSpPr>
+          <p:cNvPr id="3" name="Vertical Text Placeholder 2"/>
           <p:cNvSpPr>
             <a:spLocks noGrp="1"/>
           </p:cNvSpPr>
@@ -671,43 +578,43 @@
             <a:pPr lvl="0"/>
             <a:r>
               <a:rPr lang="en-US" smtClean="0"/>
-              <a:t>Haga clic para modificar el estilo de texto del patrón</a:t>
+              <a:t>Click to edit Master text styles</a:t>
             </a:r>
           </a:p>
           <a:p>
             <a:pPr lvl="1"/>
             <a:r>
               <a:rPr lang="en-US" smtClean="0"/>
-              <a:t>Segundo nivel</a:t>
+              <a:t>Second level</a:t>
             </a:r>
           </a:p>
           <a:p>
             <a:pPr lvl="2"/>
             <a:r>
               <a:rPr lang="en-US" smtClean="0"/>
-              <a:t>Tercer nivel</a:t>
+              <a:t>Third level</a:t>
             </a:r>
           </a:p>
           <a:p>
             <a:pPr lvl="3"/>
             <a:r>
               <a:rPr lang="en-US" smtClean="0"/>
-              <a:t>Cuarto nivel</a:t>
+              <a:t>Fourth level</a:t>
             </a:r>
           </a:p>
           <a:p>
             <a:pPr lvl="4"/>
             <a:r>
               <a:rPr lang="en-US" smtClean="0"/>
-              <a:t>Quinto nivel</a:t>
-            </a:r>
-            <a:endParaRPr lang="es-ES"/>
-          </a:p>
-        </p:txBody>
-      </p:sp>
-      <p:sp>
-        <p:nvSpPr>
-          <p:cNvPr id="4" name="Marcador de fecha 3"/>
+              <a:t>Fifth level</a:t>
+            </a:r>
+            <a:endParaRPr lang="en-US"/>
+          </a:p>
+        </p:txBody>
+      </p:sp>
+      <p:sp>
+        <p:nvSpPr>
+          <p:cNvPr id="4" name="Date Placeholder 3"/>
           <p:cNvSpPr>
             <a:spLocks noGrp="1"/>
           </p:cNvSpPr>
@@ -718,29 +625,20 @@
         <p:spPr/>
         <p:txBody>
           <a:bodyPr/>
-          <a:lstStyle>
-            <a:lvl1pPr>
-              <a:defRPr/>
-            </a:lvl1pPr>
-          </a:lstStyle>
-          <a:p>
-            <a:pPr>
-              <a:defRPr/>
-            </a:pPr>
-            <a:fld id="{3760D39B-FFA4-CB4C-BB35-1F0B8BB96B32}" type="datetimeFigureOut">
-              <a:rPr lang="es-ES"/>
-              <a:pPr>
-                <a:defRPr/>
-              </a:pPr>
-              <a:t>7/25/12</a:t>
+          <a:lstStyle/>
+          <a:p>
+            <a:fld id="{1D8BD707-D9CF-40AE-B4C6-C98DA3205C09}" type="datetimeFigureOut">
+              <a:rPr lang="en-US" smtClean="0"/>
+              <a:pPr/>
+              <a:t>9/18/2006</a:t>
             </a:fld>
-            <a:endParaRPr lang="es-ES"/>
-          </a:p>
-        </p:txBody>
-      </p:sp>
-      <p:sp>
-        <p:nvSpPr>
-          <p:cNvPr id="5" name="Marcador de pie de página 4"/>
+            <a:endParaRPr lang="en-US"/>
+          </a:p>
+        </p:txBody>
+      </p:sp>
+      <p:sp>
+        <p:nvSpPr>
+          <p:cNvPr id="5" name="Footer Placeholder 4"/>
           <p:cNvSpPr>
             <a:spLocks noGrp="1"/>
           </p:cNvSpPr>
@@ -751,22 +649,15 @@
         <p:spPr/>
         <p:txBody>
           <a:bodyPr/>
-          <a:lstStyle>
-            <a:lvl1pPr>
-              <a:defRPr/>
-            </a:lvl1pPr>
-          </a:lstStyle>
-          <a:p>
-            <a:pPr>
-              <a:defRPr/>
-            </a:pPr>
-            <a:endParaRPr lang="es-ES"/>
-          </a:p>
-        </p:txBody>
-      </p:sp>
-      <p:sp>
-        <p:nvSpPr>
-          <p:cNvPr id="6" name="Marcador de número de diapositiva 5"/>
+          <a:lstStyle/>
+          <a:p>
+            <a:endParaRPr lang="en-US"/>
+          </a:p>
+        </p:txBody>
+      </p:sp>
+      <p:sp>
+        <p:nvSpPr>
+          <p:cNvPr id="6" name="Slide Number Placeholder 5"/>
           <p:cNvSpPr>
             <a:spLocks noGrp="1"/>
           </p:cNvSpPr>
@@ -777,32 +668,18 @@
         <p:spPr/>
         <p:txBody>
           <a:bodyPr/>
-          <a:lstStyle>
-            <a:lvl1pPr>
-              <a:defRPr/>
-            </a:lvl1pPr>
-          </a:lstStyle>
-          <a:p>
-            <a:pPr>
-              <a:defRPr/>
-            </a:pPr>
-            <a:fld id="{7020FCEF-D9CA-934B-9BBF-6848F44E5CB1}" type="slidenum">
-              <a:rPr lang="es-ES"/>
-              <a:pPr>
-                <a:defRPr/>
-              </a:pPr>
-              <a:t>‹Nr.›</a:t>
+          <a:lstStyle/>
+          <a:p>
+            <a:fld id="{B6F15528-21DE-4FAA-801E-634DDDAF4B2B}" type="slidenum">
+              <a:rPr lang="en-US" smtClean="0"/>
+              <a:pPr/>
+              <a:t>‹#›</a:t>
             </a:fld>
-            <a:endParaRPr lang="es-ES"/>
+            <a:endParaRPr lang="en-US"/>
           </a:p>
         </p:txBody>
       </p:sp>
     </p:spTree>
-    <p:extLst>
-      <p:ext uri="{BB962C8B-B14F-4D97-AF65-F5344CB8AC3E}">
-        <p14:creationId xmlns:p14="http://schemas.microsoft.com/office/powerpoint/2010/main" val="1137517478"/>
-      </p:ext>
-    </p:extLst>
   </p:cSld>
   <p:clrMapOvr>
     <a:masterClrMapping/>
@@ -812,7 +689,7 @@
 
 <file path=ppt/slideLayouts/slideLayout2.xml><?xml version="1.0" encoding="utf-8"?>
 <p:sldLayout xmlns:a="http://schemas.openxmlformats.org/drawingml/2006/main" xmlns:r="http://schemas.openxmlformats.org/officeDocument/2006/relationships" xmlns:p="http://schemas.openxmlformats.org/presentationml/2006/main" type="obj" preserve="1">
-  <p:cSld name="Título y objetos">
+  <p:cSld name="Title and Content">
     <p:spTree>
       <p:nvGrpSpPr>
         <p:cNvPr id="1" name=""/>
@@ -829,7 +706,7 @@
       </p:grpSpPr>
       <p:sp>
         <p:nvSpPr>
-          <p:cNvPr id="2" name="Título 1"/>
+          <p:cNvPr id="2" name="Title 1"/>
           <p:cNvSpPr>
             <a:spLocks noGrp="1"/>
           </p:cNvSpPr>
@@ -844,15 +721,15 @@
           <a:p>
             <a:r>
               <a:rPr lang="en-US" smtClean="0"/>
-              <a:t>Clic para editar título</a:t>
-            </a:r>
-            <a:endParaRPr lang="es-ES"/>
-          </a:p>
-        </p:txBody>
-      </p:sp>
-      <p:sp>
-        <p:nvSpPr>
-          <p:cNvPr id="3" name="Marcador de contenido 2"/>
+              <a:t>Click to edit Master title style</a:t>
+            </a:r>
+            <a:endParaRPr lang="en-US"/>
+          </a:p>
+        </p:txBody>
+      </p:sp>
+      <p:sp>
+        <p:nvSpPr>
+          <p:cNvPr id="3" name="Content Placeholder 2"/>
           <p:cNvSpPr>
             <a:spLocks noGrp="1"/>
           </p:cNvSpPr>
@@ -868,43 +745,43 @@
             <a:pPr lvl="0"/>
             <a:r>
               <a:rPr lang="en-US" smtClean="0"/>
-              <a:t>Haga clic para modificar el estilo de texto del patrón</a:t>
+              <a:t>Click to edit Master text styles</a:t>
             </a:r>
           </a:p>
           <a:p>
             <a:pPr lvl="1"/>
             <a:r>
               <a:rPr lang="en-US" smtClean="0"/>
-              <a:t>Segundo nivel</a:t>
+              <a:t>Second level</a:t>
             </a:r>
           </a:p>
           <a:p>
             <a:pPr lvl="2"/>
             <a:r>
               <a:rPr lang="en-US" smtClean="0"/>
-              <a:t>Tercer nivel</a:t>
+              <a:t>Third level</a:t>
             </a:r>
           </a:p>
           <a:p>
             <a:pPr lvl="3"/>
             <a:r>
               <a:rPr lang="en-US" smtClean="0"/>
-              <a:t>Cuarto nivel</a:t>
+              <a:t>Fourth level</a:t>
             </a:r>
           </a:p>
           <a:p>
             <a:pPr lvl="4"/>
             <a:r>
               <a:rPr lang="en-US" smtClean="0"/>
-              <a:t>Quinto nivel</a:t>
-            </a:r>
-            <a:endParaRPr lang="es-ES"/>
-          </a:p>
-        </p:txBody>
-      </p:sp>
-      <p:sp>
-        <p:nvSpPr>
-          <p:cNvPr id="4" name="Marcador de fecha 3"/>
+              <a:t>Fifth level</a:t>
+            </a:r>
+            <a:endParaRPr lang="en-US"/>
+          </a:p>
+        </p:txBody>
+      </p:sp>
+      <p:sp>
+        <p:nvSpPr>
+          <p:cNvPr id="4" name="Date Placeholder 3"/>
           <p:cNvSpPr>
             <a:spLocks noGrp="1"/>
           </p:cNvSpPr>
@@ -915,29 +792,20 @@
         <p:spPr/>
         <p:txBody>
           <a:bodyPr/>
-          <a:lstStyle>
-            <a:lvl1pPr>
-              <a:defRPr/>
-            </a:lvl1pPr>
-          </a:lstStyle>
-          <a:p>
-            <a:pPr>
-              <a:defRPr/>
-            </a:pPr>
-            <a:fld id="{837395DD-DD7D-5447-8094-7D04F92E60AF}" type="datetimeFigureOut">
-              <a:rPr lang="es-ES"/>
-              <a:pPr>
-                <a:defRPr/>
-              </a:pPr>
-              <a:t>7/25/12</a:t>
+          <a:lstStyle/>
+          <a:p>
+            <a:fld id="{1D8BD707-D9CF-40AE-B4C6-C98DA3205C09}" type="datetimeFigureOut">
+              <a:rPr lang="en-US" smtClean="0"/>
+              <a:pPr/>
+              <a:t>9/18/2006</a:t>
             </a:fld>
-            <a:endParaRPr lang="es-ES"/>
-          </a:p>
-        </p:txBody>
-      </p:sp>
-      <p:sp>
-        <p:nvSpPr>
-          <p:cNvPr id="5" name="Marcador de pie de página 4"/>
+            <a:endParaRPr lang="en-US"/>
+          </a:p>
+        </p:txBody>
+      </p:sp>
+      <p:sp>
+        <p:nvSpPr>
+          <p:cNvPr id="5" name="Footer Placeholder 4"/>
           <p:cNvSpPr>
             <a:spLocks noGrp="1"/>
           </p:cNvSpPr>
@@ -948,22 +816,15 @@
         <p:spPr/>
         <p:txBody>
           <a:bodyPr/>
-          <a:lstStyle>
-            <a:lvl1pPr>
-              <a:defRPr/>
-            </a:lvl1pPr>
-          </a:lstStyle>
-          <a:p>
-            <a:pPr>
-              <a:defRPr/>
-            </a:pPr>
-            <a:endParaRPr lang="es-ES"/>
-          </a:p>
-        </p:txBody>
-      </p:sp>
-      <p:sp>
-        <p:nvSpPr>
-          <p:cNvPr id="6" name="Marcador de número de diapositiva 5"/>
+          <a:lstStyle/>
+          <a:p>
+            <a:endParaRPr lang="en-US"/>
+          </a:p>
+        </p:txBody>
+      </p:sp>
+      <p:sp>
+        <p:nvSpPr>
+          <p:cNvPr id="6" name="Slide Number Placeholder 5"/>
           <p:cNvSpPr>
             <a:spLocks noGrp="1"/>
           </p:cNvSpPr>
@@ -974,32 +835,18 @@
         <p:spPr/>
         <p:txBody>
           <a:bodyPr/>
-          <a:lstStyle>
-            <a:lvl1pPr>
-              <a:defRPr/>
-            </a:lvl1pPr>
-          </a:lstStyle>
-          <a:p>
-            <a:pPr>
-              <a:defRPr/>
-            </a:pPr>
-            <a:fld id="{FFE16BCD-E314-FA45-9B4E-50D6285C0787}" type="slidenum">
-              <a:rPr lang="es-ES"/>
-              <a:pPr>
-                <a:defRPr/>
-              </a:pPr>
-              <a:t>‹Nr.›</a:t>
+          <a:lstStyle/>
+          <a:p>
+            <a:fld id="{B6F15528-21DE-4FAA-801E-634DDDAF4B2B}" type="slidenum">
+              <a:rPr lang="en-US" smtClean="0"/>
+              <a:pPr/>
+              <a:t>‹#›</a:t>
             </a:fld>
-            <a:endParaRPr lang="es-ES"/>
+            <a:endParaRPr lang="en-US"/>
           </a:p>
         </p:txBody>
       </p:sp>
     </p:spTree>
-    <p:extLst>
-      <p:ext uri="{BB962C8B-B14F-4D97-AF65-F5344CB8AC3E}">
-        <p14:creationId xmlns:p14="http://schemas.microsoft.com/office/powerpoint/2010/main" val="2379493456"/>
-      </p:ext>
-    </p:extLst>
   </p:cSld>
   <p:clrMapOvr>
     <a:masterClrMapping/>
@@ -1009,7 +856,7 @@
 
 <file path=ppt/slideLayouts/slideLayout3.xml><?xml version="1.0" encoding="utf-8"?>
 <p:sldLayout xmlns:a="http://schemas.openxmlformats.org/drawingml/2006/main" xmlns:r="http://schemas.openxmlformats.org/officeDocument/2006/relationships" xmlns:p="http://schemas.openxmlformats.org/presentationml/2006/main" type="secHead" preserve="1">
-  <p:cSld name="Encabezado de sección">
+  <p:cSld name="Section Header">
     <p:spTree>
       <p:nvGrpSpPr>
         <p:cNvPr id="1" name=""/>
@@ -1026,7 +873,7 @@
       </p:grpSpPr>
       <p:sp>
         <p:nvSpPr>
-          <p:cNvPr id="2" name="Título 1"/>
+          <p:cNvPr id="2" name="Title 1"/>
           <p:cNvSpPr>
             <a:spLocks noGrp="1"/>
           </p:cNvSpPr>
@@ -1050,15 +897,15 @@
           <a:p>
             <a:r>
               <a:rPr lang="en-US" smtClean="0"/>
-              <a:t>Clic para editar título</a:t>
-            </a:r>
-            <a:endParaRPr lang="es-ES"/>
-          </a:p>
-        </p:txBody>
-      </p:sp>
-      <p:sp>
-        <p:nvSpPr>
-          <p:cNvPr id="3" name="Marcador de texto 2"/>
+              <a:t>Click to edit Master title style</a:t>
+            </a:r>
+            <a:endParaRPr lang="en-US"/>
+          </a:p>
+        </p:txBody>
+      </p:sp>
+      <p:sp>
+        <p:nvSpPr>
+          <p:cNvPr id="3" name="Text Placeholder 2"/>
           <p:cNvSpPr>
             <a:spLocks noGrp="1"/>
           </p:cNvSpPr>
@@ -1170,14 +1017,14 @@
             <a:pPr lvl="0"/>
             <a:r>
               <a:rPr lang="en-US" smtClean="0"/>
-              <a:t>Haga clic para modificar el estilo de texto del patrón</a:t>
-            </a:r>
-          </a:p>
-        </p:txBody>
-      </p:sp>
-      <p:sp>
-        <p:nvSpPr>
-          <p:cNvPr id="4" name="Marcador de fecha 3"/>
+              <a:t>Click to edit Master text styles</a:t>
+            </a:r>
+          </a:p>
+        </p:txBody>
+      </p:sp>
+      <p:sp>
+        <p:nvSpPr>
+          <p:cNvPr id="4" name="Date Placeholder 3"/>
           <p:cNvSpPr>
             <a:spLocks noGrp="1"/>
           </p:cNvSpPr>
@@ -1188,29 +1035,20 @@
         <p:spPr/>
         <p:txBody>
           <a:bodyPr/>
-          <a:lstStyle>
-            <a:lvl1pPr>
-              <a:defRPr/>
-            </a:lvl1pPr>
-          </a:lstStyle>
-          <a:p>
-            <a:pPr>
-              <a:defRPr/>
-            </a:pPr>
-            <a:fld id="{397846C8-1F61-FD4B-8547-A1DE503AA626}" type="datetimeFigureOut">
-              <a:rPr lang="es-ES"/>
-              <a:pPr>
-                <a:defRPr/>
-              </a:pPr>
-              <a:t>7/25/12</a:t>
+          <a:lstStyle/>
+          <a:p>
+            <a:fld id="{1D8BD707-D9CF-40AE-B4C6-C98DA3205C09}" type="datetimeFigureOut">
+              <a:rPr lang="en-US" smtClean="0"/>
+              <a:pPr/>
+              <a:t>9/18/2006</a:t>
             </a:fld>
-            <a:endParaRPr lang="es-ES"/>
-          </a:p>
-        </p:txBody>
-      </p:sp>
-      <p:sp>
-        <p:nvSpPr>
-          <p:cNvPr id="5" name="Marcador de pie de página 4"/>
+            <a:endParaRPr lang="en-US"/>
+          </a:p>
+        </p:txBody>
+      </p:sp>
+      <p:sp>
+        <p:nvSpPr>
+          <p:cNvPr id="5" name="Footer Placeholder 4"/>
           <p:cNvSpPr>
             <a:spLocks noGrp="1"/>
           </p:cNvSpPr>
@@ -1221,22 +1059,15 @@
         <p:spPr/>
         <p:txBody>
           <a:bodyPr/>
-          <a:lstStyle>
-            <a:lvl1pPr>
-              <a:defRPr/>
-            </a:lvl1pPr>
-          </a:lstStyle>
-          <a:p>
-            <a:pPr>
-              <a:defRPr/>
-            </a:pPr>
-            <a:endParaRPr lang="es-ES"/>
-          </a:p>
-        </p:txBody>
-      </p:sp>
-      <p:sp>
-        <p:nvSpPr>
-          <p:cNvPr id="6" name="Marcador de número de diapositiva 5"/>
+          <a:lstStyle/>
+          <a:p>
+            <a:endParaRPr lang="en-US"/>
+          </a:p>
+        </p:txBody>
+      </p:sp>
+      <p:sp>
+        <p:nvSpPr>
+          <p:cNvPr id="6" name="Slide Number Placeholder 5"/>
           <p:cNvSpPr>
             <a:spLocks noGrp="1"/>
           </p:cNvSpPr>
@@ -1247,32 +1078,18 @@
         <p:spPr/>
         <p:txBody>
           <a:bodyPr/>
-          <a:lstStyle>
-            <a:lvl1pPr>
-              <a:defRPr/>
-            </a:lvl1pPr>
-          </a:lstStyle>
-          <a:p>
-            <a:pPr>
-              <a:defRPr/>
-            </a:pPr>
-            <a:fld id="{C13C1AB8-4690-8A46-A3F9-42B2D7A8F808}" type="slidenum">
-              <a:rPr lang="es-ES"/>
-              <a:pPr>
-                <a:defRPr/>
-              </a:pPr>
-              <a:t>‹Nr.›</a:t>
+          <a:lstStyle/>
+          <a:p>
+            <a:fld id="{B6F15528-21DE-4FAA-801E-634DDDAF4B2B}" type="slidenum">
+              <a:rPr lang="en-US" smtClean="0"/>
+              <a:pPr/>
+              <a:t>‹#›</a:t>
             </a:fld>
-            <a:endParaRPr lang="es-ES"/>
+            <a:endParaRPr lang="en-US"/>
           </a:p>
         </p:txBody>
       </p:sp>
     </p:spTree>
-    <p:extLst>
-      <p:ext uri="{BB962C8B-B14F-4D97-AF65-F5344CB8AC3E}">
-        <p14:creationId xmlns:p14="http://schemas.microsoft.com/office/powerpoint/2010/main" val="112059045"/>
-      </p:ext>
-    </p:extLst>
   </p:cSld>
   <p:clrMapOvr>
     <a:masterClrMapping/>
@@ -1282,7 +1099,7 @@
 
 <file path=ppt/slideLayouts/slideLayout4.xml><?xml version="1.0" encoding="utf-8"?>
 <p:sldLayout xmlns:a="http://schemas.openxmlformats.org/drawingml/2006/main" xmlns:r="http://schemas.openxmlformats.org/officeDocument/2006/relationships" xmlns:p="http://schemas.openxmlformats.org/presentationml/2006/main" type="twoObj" preserve="1">
-  <p:cSld name="Dos objetos">
+  <p:cSld name="Two Content">
     <p:spTree>
       <p:nvGrpSpPr>
         <p:cNvPr id="1" name=""/>
@@ -1299,7 +1116,7 @@
       </p:grpSpPr>
       <p:sp>
         <p:nvSpPr>
-          <p:cNvPr id="2" name="Título 1"/>
+          <p:cNvPr id="2" name="Title 1"/>
           <p:cNvSpPr>
             <a:spLocks noGrp="1"/>
           </p:cNvSpPr>
@@ -1314,15 +1131,15 @@
           <a:p>
             <a:r>
               <a:rPr lang="en-US" smtClean="0"/>
-              <a:t>Clic para editar título</a:t>
-            </a:r>
-            <a:endParaRPr lang="es-ES"/>
-          </a:p>
-        </p:txBody>
-      </p:sp>
-      <p:sp>
-        <p:nvSpPr>
-          <p:cNvPr id="3" name="Marcador de contenido 2"/>
+              <a:t>Click to edit Master title style</a:t>
+            </a:r>
+            <a:endParaRPr lang="en-US"/>
+          </a:p>
+        </p:txBody>
+      </p:sp>
+      <p:sp>
+        <p:nvSpPr>
+          <p:cNvPr id="3" name="Content Placeholder 2"/>
           <p:cNvSpPr>
             <a:spLocks noGrp="1"/>
           </p:cNvSpPr>
@@ -1371,43 +1188,43 @@
             <a:pPr lvl="0"/>
             <a:r>
               <a:rPr lang="en-US" smtClean="0"/>
-              <a:t>Haga clic para modificar el estilo de texto del patrón</a:t>
+              <a:t>Click to edit Master text styles</a:t>
             </a:r>
           </a:p>
           <a:p>
             <a:pPr lvl="1"/>
             <a:r>
               <a:rPr lang="en-US" smtClean="0"/>
-              <a:t>Segundo nivel</a:t>
+              <a:t>Second level</a:t>
             </a:r>
           </a:p>
           <a:p>
             <a:pPr lvl="2"/>
             <a:r>
               <a:rPr lang="en-US" smtClean="0"/>
-              <a:t>Tercer nivel</a:t>
+              <a:t>Third level</a:t>
             </a:r>
           </a:p>
           <a:p>
             <a:pPr lvl="3"/>
             <a:r>
               <a:rPr lang="en-US" smtClean="0"/>
-              <a:t>Cuarto nivel</a:t>
+              <a:t>Fourth level</a:t>
             </a:r>
           </a:p>
           <a:p>
             <a:pPr lvl="4"/>
             <a:r>
               <a:rPr lang="en-US" smtClean="0"/>
-              <a:t>Quinto nivel</a:t>
-            </a:r>
-            <a:endParaRPr lang="es-ES"/>
-          </a:p>
-        </p:txBody>
-      </p:sp>
-      <p:sp>
-        <p:nvSpPr>
-          <p:cNvPr id="4" name="Marcador de contenido 3"/>
+              <a:t>Fifth level</a:t>
+            </a:r>
+            <a:endParaRPr lang="en-US"/>
+          </a:p>
+        </p:txBody>
+      </p:sp>
+      <p:sp>
+        <p:nvSpPr>
+          <p:cNvPr id="4" name="Content Placeholder 3"/>
           <p:cNvSpPr>
             <a:spLocks noGrp="1"/>
           </p:cNvSpPr>
@@ -1456,43 +1273,43 @@
             <a:pPr lvl="0"/>
             <a:r>
               <a:rPr lang="en-US" smtClean="0"/>
-              <a:t>Haga clic para modificar el estilo de texto del patrón</a:t>
+              <a:t>Click to edit Master text styles</a:t>
             </a:r>
           </a:p>
           <a:p>
             <a:pPr lvl="1"/>
             <a:r>
               <a:rPr lang="en-US" smtClean="0"/>
-              <a:t>Segundo nivel</a:t>
+              <a:t>Second level</a:t>
             </a:r>
           </a:p>
           <a:p>
             <a:pPr lvl="2"/>
             <a:r>
               <a:rPr lang="en-US" smtClean="0"/>
-              <a:t>Tercer nivel</a:t>
+              <a:t>Third level</a:t>
             </a:r>
           </a:p>
           <a:p>
             <a:pPr lvl="3"/>
             <a:r>
               <a:rPr lang="en-US" smtClean="0"/>
-              <a:t>Cuarto nivel</a:t>
+              <a:t>Fourth level</a:t>
             </a:r>
           </a:p>
           <a:p>
             <a:pPr lvl="4"/>
             <a:r>
               <a:rPr lang="en-US" smtClean="0"/>
-              <a:t>Quinto nivel</a:t>
-            </a:r>
-            <a:endParaRPr lang="es-ES"/>
-          </a:p>
-        </p:txBody>
-      </p:sp>
-      <p:sp>
-        <p:nvSpPr>
-          <p:cNvPr id="5" name="Marcador de fecha 3"/>
+              <a:t>Fifth level</a:t>
+            </a:r>
+            <a:endParaRPr lang="en-US"/>
+          </a:p>
+        </p:txBody>
+      </p:sp>
+      <p:sp>
+        <p:nvSpPr>
+          <p:cNvPr id="5" name="Date Placeholder 4"/>
           <p:cNvSpPr>
             <a:spLocks noGrp="1"/>
           </p:cNvSpPr>
@@ -1503,29 +1320,20 @@
         <p:spPr/>
         <p:txBody>
           <a:bodyPr/>
-          <a:lstStyle>
-            <a:lvl1pPr>
-              <a:defRPr/>
-            </a:lvl1pPr>
-          </a:lstStyle>
-          <a:p>
-            <a:pPr>
-              <a:defRPr/>
-            </a:pPr>
-            <a:fld id="{7760EEF5-0AC7-E34A-B8A3-1F4F3A60A71E}" type="datetimeFigureOut">
-              <a:rPr lang="es-ES"/>
-              <a:pPr>
-                <a:defRPr/>
-              </a:pPr>
-              <a:t>7/25/12</a:t>
+          <a:lstStyle/>
+          <a:p>
+            <a:fld id="{1D8BD707-D9CF-40AE-B4C6-C98DA3205C09}" type="datetimeFigureOut">
+              <a:rPr lang="en-US" smtClean="0"/>
+              <a:pPr/>
+              <a:t>9/18/2006</a:t>
             </a:fld>
-            <a:endParaRPr lang="es-ES"/>
-          </a:p>
-        </p:txBody>
-      </p:sp>
-      <p:sp>
-        <p:nvSpPr>
-          <p:cNvPr id="6" name="Marcador de pie de página 4"/>
+            <a:endParaRPr lang="en-US"/>
+          </a:p>
+        </p:txBody>
+      </p:sp>
+      <p:sp>
+        <p:nvSpPr>
+          <p:cNvPr id="6" name="Footer Placeholder 5"/>
           <p:cNvSpPr>
             <a:spLocks noGrp="1"/>
           </p:cNvSpPr>
@@ -1536,22 +1344,15 @@
         <p:spPr/>
         <p:txBody>
           <a:bodyPr/>
-          <a:lstStyle>
-            <a:lvl1pPr>
-              <a:defRPr/>
-            </a:lvl1pPr>
-          </a:lstStyle>
-          <a:p>
-            <a:pPr>
-              <a:defRPr/>
-            </a:pPr>
-            <a:endParaRPr lang="es-ES"/>
-          </a:p>
-        </p:txBody>
-      </p:sp>
-      <p:sp>
-        <p:nvSpPr>
-          <p:cNvPr id="7" name="Marcador de número de diapositiva 5"/>
+          <a:lstStyle/>
+          <a:p>
+            <a:endParaRPr lang="en-US"/>
+          </a:p>
+        </p:txBody>
+      </p:sp>
+      <p:sp>
+        <p:nvSpPr>
+          <p:cNvPr id="7" name="Slide Number Placeholder 6"/>
           <p:cNvSpPr>
             <a:spLocks noGrp="1"/>
           </p:cNvSpPr>
@@ -1562,32 +1363,18 @@
         <p:spPr/>
         <p:txBody>
           <a:bodyPr/>
-          <a:lstStyle>
-            <a:lvl1pPr>
-              <a:defRPr/>
-            </a:lvl1pPr>
-          </a:lstStyle>
-          <a:p>
-            <a:pPr>
-              <a:defRPr/>
-            </a:pPr>
-            <a:fld id="{B08A5BD0-52F5-E647-9AED-8233081B4B4C}" type="slidenum">
-              <a:rPr lang="es-ES"/>
-              <a:pPr>
-                <a:defRPr/>
-              </a:pPr>
-              <a:t>‹Nr.›</a:t>
+          <a:lstStyle/>
+          <a:p>
+            <a:fld id="{B6F15528-21DE-4FAA-801E-634DDDAF4B2B}" type="slidenum">
+              <a:rPr lang="en-US" smtClean="0"/>
+              <a:pPr/>
+              <a:t>‹#›</a:t>
             </a:fld>
-            <a:endParaRPr lang="es-ES"/>
+            <a:endParaRPr lang="en-US"/>
           </a:p>
         </p:txBody>
       </p:sp>
     </p:spTree>
-    <p:extLst>
-      <p:ext uri="{BB962C8B-B14F-4D97-AF65-F5344CB8AC3E}">
-        <p14:creationId xmlns:p14="http://schemas.microsoft.com/office/powerpoint/2010/main" val="978650973"/>
-      </p:ext>
-    </p:extLst>
   </p:cSld>
   <p:clrMapOvr>
     <a:masterClrMapping/>
@@ -1597,7 +1384,7 @@
 
 <file path=ppt/slideLayouts/slideLayout5.xml><?xml version="1.0" encoding="utf-8"?>
 <p:sldLayout xmlns:a="http://schemas.openxmlformats.org/drawingml/2006/main" xmlns:r="http://schemas.openxmlformats.org/officeDocument/2006/relationships" xmlns:p="http://schemas.openxmlformats.org/presentationml/2006/main" type="twoTxTwoObj" preserve="1">
-  <p:cSld name="Comparación">
+  <p:cSld name="Comparison">
     <p:spTree>
       <p:nvGrpSpPr>
         <p:cNvPr id="1" name=""/>
@@ -1614,7 +1401,7 @@
       </p:grpSpPr>
       <p:sp>
         <p:nvSpPr>
-          <p:cNvPr id="2" name="Título 1"/>
+          <p:cNvPr id="2" name="Title 1"/>
           <p:cNvSpPr>
             <a:spLocks noGrp="1"/>
           </p:cNvSpPr>
@@ -1633,15 +1420,15 @@
           <a:p>
             <a:r>
               <a:rPr lang="en-US" smtClean="0"/>
-              <a:t>Clic para editar título</a:t>
-            </a:r>
-            <a:endParaRPr lang="es-ES"/>
-          </a:p>
-        </p:txBody>
-      </p:sp>
-      <p:sp>
-        <p:nvSpPr>
-          <p:cNvPr id="3" name="Marcador de texto 2"/>
+              <a:t>Click to edit Master title style</a:t>
+            </a:r>
+            <a:endParaRPr lang="en-US"/>
+          </a:p>
+        </p:txBody>
+      </p:sp>
+      <p:sp>
+        <p:nvSpPr>
+          <p:cNvPr id="3" name="Text Placeholder 2"/>
           <p:cNvSpPr>
             <a:spLocks noGrp="1"/>
           </p:cNvSpPr>
@@ -1699,14 +1486,14 @@
             <a:pPr lvl="0"/>
             <a:r>
               <a:rPr lang="en-US" smtClean="0"/>
-              <a:t>Haga clic para modificar el estilo de texto del patrón</a:t>
-            </a:r>
-          </a:p>
-        </p:txBody>
-      </p:sp>
-      <p:sp>
-        <p:nvSpPr>
-          <p:cNvPr id="4" name="Marcador de contenido 3"/>
+              <a:t>Click to edit Master text styles</a:t>
+            </a:r>
+          </a:p>
+        </p:txBody>
+      </p:sp>
+      <p:sp>
+        <p:nvSpPr>
+          <p:cNvPr id="4" name="Content Placeholder 3"/>
           <p:cNvSpPr>
             <a:spLocks noGrp="1"/>
           </p:cNvSpPr>
@@ -1755,43 +1542,43 @@
             <a:pPr lvl="0"/>
             <a:r>
               <a:rPr lang="en-US" smtClean="0"/>
-              <a:t>Haga clic para modificar el estilo de texto del patrón</a:t>
+              <a:t>Click to edit Master text styles</a:t>
             </a:r>
           </a:p>
           <a:p>
             <a:pPr lvl="1"/>
             <a:r>
               <a:rPr lang="en-US" smtClean="0"/>
-              <a:t>Segundo nivel</a:t>
+              <a:t>Second level</a:t>
             </a:r>
           </a:p>
           <a:p>
             <a:pPr lvl="2"/>
             <a:r>
               <a:rPr lang="en-US" smtClean="0"/>
-              <a:t>Tercer nivel</a:t>
+              <a:t>Third level</a:t>
             </a:r>
           </a:p>
           <a:p>
             <a:pPr lvl="3"/>
             <a:r>
               <a:rPr lang="en-US" smtClean="0"/>
-              <a:t>Cuarto nivel</a:t>
+              <a:t>Fourth level</a:t>
             </a:r>
           </a:p>
           <a:p>
             <a:pPr lvl="4"/>
             <a:r>
               <a:rPr lang="en-US" smtClean="0"/>
-              <a:t>Quinto nivel</a:t>
-            </a:r>
-            <a:endParaRPr lang="es-ES"/>
-          </a:p>
-        </p:txBody>
-      </p:sp>
-      <p:sp>
-        <p:nvSpPr>
-          <p:cNvPr id="5" name="Marcador de texto 4"/>
+              <a:t>Fifth level</a:t>
+            </a:r>
+            <a:endParaRPr lang="en-US"/>
+          </a:p>
+        </p:txBody>
+      </p:sp>
+      <p:sp>
+        <p:nvSpPr>
+          <p:cNvPr id="5" name="Text Placeholder 4"/>
           <p:cNvSpPr>
             <a:spLocks noGrp="1"/>
           </p:cNvSpPr>
@@ -1849,14 +1636,14 @@
             <a:pPr lvl="0"/>
             <a:r>
               <a:rPr lang="en-US" smtClean="0"/>
-              <a:t>Haga clic para modificar el estilo de texto del patrón</a:t>
-            </a:r>
-          </a:p>
-        </p:txBody>
-      </p:sp>
-      <p:sp>
-        <p:nvSpPr>
-          <p:cNvPr id="6" name="Marcador de contenido 5"/>
+              <a:t>Click to edit Master text styles</a:t>
+            </a:r>
+          </a:p>
+        </p:txBody>
+      </p:sp>
+      <p:sp>
+        <p:nvSpPr>
+          <p:cNvPr id="6" name="Content Placeholder 5"/>
           <p:cNvSpPr>
             <a:spLocks noGrp="1"/>
           </p:cNvSpPr>
@@ -1905,43 +1692,43 @@
             <a:pPr lvl="0"/>
             <a:r>
               <a:rPr lang="en-US" smtClean="0"/>
-              <a:t>Haga clic para modificar el estilo de texto del patrón</a:t>
+              <a:t>Click to edit Master text styles</a:t>
             </a:r>
           </a:p>
           <a:p>
             <a:pPr lvl="1"/>
             <a:r>
               <a:rPr lang="en-US" smtClean="0"/>
-              <a:t>Segundo nivel</a:t>
+              <a:t>Second level</a:t>
             </a:r>
           </a:p>
           <a:p>
             <a:pPr lvl="2"/>
             <a:r>
               <a:rPr lang="en-US" smtClean="0"/>
-              <a:t>Tercer nivel</a:t>
+              <a:t>Third level</a:t>
             </a:r>
           </a:p>
           <a:p>
             <a:pPr lvl="3"/>
             <a:r>
               <a:rPr lang="en-US" smtClean="0"/>
-              <a:t>Cuarto nivel</a:t>
+              <a:t>Fourth level</a:t>
             </a:r>
           </a:p>
           <a:p>
             <a:pPr lvl="4"/>
             <a:r>
               <a:rPr lang="en-US" smtClean="0"/>
-              <a:t>Quinto nivel</a:t>
-            </a:r>
-            <a:endParaRPr lang="es-ES"/>
-          </a:p>
-        </p:txBody>
-      </p:sp>
-      <p:sp>
-        <p:nvSpPr>
-          <p:cNvPr id="7" name="Marcador de fecha 3"/>
+              <a:t>Fifth level</a:t>
+            </a:r>
+            <a:endParaRPr lang="en-US"/>
+          </a:p>
+        </p:txBody>
+      </p:sp>
+      <p:sp>
+        <p:nvSpPr>
+          <p:cNvPr id="7" name="Date Placeholder 6"/>
           <p:cNvSpPr>
             <a:spLocks noGrp="1"/>
           </p:cNvSpPr>
@@ -1952,29 +1739,20 @@
         <p:spPr/>
         <p:txBody>
           <a:bodyPr/>
-          <a:lstStyle>
-            <a:lvl1pPr>
-              <a:defRPr/>
-            </a:lvl1pPr>
-          </a:lstStyle>
-          <a:p>
-            <a:pPr>
-              <a:defRPr/>
-            </a:pPr>
-            <a:fld id="{EC606D45-1E83-904C-9303-D76E6BA195A0}" type="datetimeFigureOut">
-              <a:rPr lang="es-ES"/>
-              <a:pPr>
-                <a:defRPr/>
-              </a:pPr>
-              <a:t>7/25/12</a:t>
+          <a:lstStyle/>
+          <a:p>
+            <a:fld id="{1D8BD707-D9CF-40AE-B4C6-C98DA3205C09}" type="datetimeFigureOut">
+              <a:rPr lang="en-US" smtClean="0"/>
+              <a:pPr/>
+              <a:t>9/18/2006</a:t>
             </a:fld>
-            <a:endParaRPr lang="es-ES"/>
-          </a:p>
-        </p:txBody>
-      </p:sp>
-      <p:sp>
-        <p:nvSpPr>
-          <p:cNvPr id="8" name="Marcador de pie de página 4"/>
+            <a:endParaRPr lang="en-US"/>
+          </a:p>
+        </p:txBody>
+      </p:sp>
+      <p:sp>
+        <p:nvSpPr>
+          <p:cNvPr id="8" name="Footer Placeholder 7"/>
           <p:cNvSpPr>
             <a:spLocks noGrp="1"/>
           </p:cNvSpPr>
@@ -1985,22 +1763,15 @@
         <p:spPr/>
         <p:txBody>
           <a:bodyPr/>
-          <a:lstStyle>
-            <a:lvl1pPr>
-              <a:defRPr/>
-            </a:lvl1pPr>
-          </a:lstStyle>
-          <a:p>
-            <a:pPr>
-              <a:defRPr/>
-            </a:pPr>
-            <a:endParaRPr lang="es-ES"/>
-          </a:p>
-        </p:txBody>
-      </p:sp>
-      <p:sp>
-        <p:nvSpPr>
-          <p:cNvPr id="9" name="Marcador de número de diapositiva 5"/>
+          <a:lstStyle/>
+          <a:p>
+            <a:endParaRPr lang="en-US"/>
+          </a:p>
+        </p:txBody>
+      </p:sp>
+      <p:sp>
+        <p:nvSpPr>
+          <p:cNvPr id="9" name="Slide Number Placeholder 8"/>
           <p:cNvSpPr>
             <a:spLocks noGrp="1"/>
           </p:cNvSpPr>
@@ -2011,32 +1782,18 @@
         <p:spPr/>
         <p:txBody>
           <a:bodyPr/>
-          <a:lstStyle>
-            <a:lvl1pPr>
-              <a:defRPr/>
-            </a:lvl1pPr>
-          </a:lstStyle>
-          <a:p>
-            <a:pPr>
-              <a:defRPr/>
-            </a:pPr>
-            <a:fld id="{790E0503-146F-934C-B35C-47C0F9C99AEC}" type="slidenum">
-              <a:rPr lang="es-ES"/>
-              <a:pPr>
-                <a:defRPr/>
-              </a:pPr>
-              <a:t>‹Nr.›</a:t>
+          <a:lstStyle/>
+          <a:p>
+            <a:fld id="{B6F15528-21DE-4FAA-801E-634DDDAF4B2B}" type="slidenum">
+              <a:rPr lang="en-US" smtClean="0"/>
+              <a:pPr/>
+              <a:t>‹#›</a:t>
             </a:fld>
-            <a:endParaRPr lang="es-ES"/>
+            <a:endParaRPr lang="en-US"/>
           </a:p>
         </p:txBody>
       </p:sp>
     </p:spTree>
-    <p:extLst>
-      <p:ext uri="{BB962C8B-B14F-4D97-AF65-F5344CB8AC3E}">
-        <p14:creationId xmlns:p14="http://schemas.microsoft.com/office/powerpoint/2010/main" val="2298762409"/>
-      </p:ext>
-    </p:extLst>
   </p:cSld>
   <p:clrMapOvr>
     <a:masterClrMapping/>
@@ -2046,7 +1803,7 @@
 
 <file path=ppt/slideLayouts/slideLayout6.xml><?xml version="1.0" encoding="utf-8"?>
 <p:sldLayout xmlns:a="http://schemas.openxmlformats.org/drawingml/2006/main" xmlns:r="http://schemas.openxmlformats.org/officeDocument/2006/relationships" xmlns:p="http://schemas.openxmlformats.org/presentationml/2006/main" type="titleOnly" preserve="1">
-  <p:cSld name="Sólo el título">
+  <p:cSld name="Title Only">
     <p:spTree>
       <p:nvGrpSpPr>
         <p:cNvPr id="1" name=""/>
@@ -2063,7 +1820,7 @@
       </p:grpSpPr>
       <p:sp>
         <p:nvSpPr>
-          <p:cNvPr id="2" name="Título 1"/>
+          <p:cNvPr id="2" name="Title 1"/>
           <p:cNvSpPr>
             <a:spLocks noGrp="1"/>
           </p:cNvSpPr>
@@ -2078,15 +1835,15 @@
           <a:p>
             <a:r>
               <a:rPr lang="en-US" smtClean="0"/>
-              <a:t>Clic para editar título</a:t>
-            </a:r>
-            <a:endParaRPr lang="es-ES"/>
-          </a:p>
-        </p:txBody>
-      </p:sp>
-      <p:sp>
-        <p:nvSpPr>
-          <p:cNvPr id="3" name="Marcador de fecha 3"/>
+              <a:t>Click to edit Master title style</a:t>
+            </a:r>
+            <a:endParaRPr lang="en-US"/>
+          </a:p>
+        </p:txBody>
+      </p:sp>
+      <p:sp>
+        <p:nvSpPr>
+          <p:cNvPr id="3" name="Date Placeholder 2"/>
           <p:cNvSpPr>
             <a:spLocks noGrp="1"/>
           </p:cNvSpPr>
@@ -2097,29 +1854,20 @@
         <p:spPr/>
         <p:txBody>
           <a:bodyPr/>
-          <a:lstStyle>
-            <a:lvl1pPr>
-              <a:defRPr/>
-            </a:lvl1pPr>
-          </a:lstStyle>
-          <a:p>
-            <a:pPr>
-              <a:defRPr/>
-            </a:pPr>
-            <a:fld id="{085593B8-863D-474D-8195-4F644F0B460C}" type="datetimeFigureOut">
-              <a:rPr lang="es-ES"/>
-              <a:pPr>
-                <a:defRPr/>
-              </a:pPr>
-              <a:t>7/25/12</a:t>
+          <a:lstStyle/>
+          <a:p>
+            <a:fld id="{1D8BD707-D9CF-40AE-B4C6-C98DA3205C09}" type="datetimeFigureOut">
+              <a:rPr lang="en-US" smtClean="0"/>
+              <a:pPr/>
+              <a:t>9/18/2006</a:t>
             </a:fld>
-            <a:endParaRPr lang="es-ES"/>
-          </a:p>
-        </p:txBody>
-      </p:sp>
-      <p:sp>
-        <p:nvSpPr>
-          <p:cNvPr id="4" name="Marcador de pie de página 4"/>
+            <a:endParaRPr lang="en-US"/>
+          </a:p>
+        </p:txBody>
+      </p:sp>
+      <p:sp>
+        <p:nvSpPr>
+          <p:cNvPr id="4" name="Footer Placeholder 3"/>
           <p:cNvSpPr>
             <a:spLocks noGrp="1"/>
           </p:cNvSpPr>
@@ -2130,22 +1878,15 @@
         <p:spPr/>
         <p:txBody>
           <a:bodyPr/>
-          <a:lstStyle>
-            <a:lvl1pPr>
-              <a:defRPr/>
-            </a:lvl1pPr>
-          </a:lstStyle>
-          <a:p>
-            <a:pPr>
-              <a:defRPr/>
-            </a:pPr>
-            <a:endParaRPr lang="es-ES"/>
-          </a:p>
-        </p:txBody>
-      </p:sp>
-      <p:sp>
-        <p:nvSpPr>
-          <p:cNvPr id="5" name="Marcador de número de diapositiva 5"/>
+          <a:lstStyle/>
+          <a:p>
+            <a:endParaRPr lang="en-US"/>
+          </a:p>
+        </p:txBody>
+      </p:sp>
+      <p:sp>
+        <p:nvSpPr>
+          <p:cNvPr id="5" name="Slide Number Placeholder 4"/>
           <p:cNvSpPr>
             <a:spLocks noGrp="1"/>
           </p:cNvSpPr>
@@ -2156,32 +1897,18 @@
         <p:spPr/>
         <p:txBody>
           <a:bodyPr/>
-          <a:lstStyle>
-            <a:lvl1pPr>
-              <a:defRPr/>
-            </a:lvl1pPr>
-          </a:lstStyle>
-          <a:p>
-            <a:pPr>
-              <a:defRPr/>
-            </a:pPr>
-            <a:fld id="{E390F93B-9352-D34D-B4D6-E425A32FB876}" type="slidenum">
-              <a:rPr lang="es-ES"/>
-              <a:pPr>
-                <a:defRPr/>
-              </a:pPr>
-              <a:t>‹Nr.›</a:t>
+          <a:lstStyle/>
+          <a:p>
+            <a:fld id="{B6F15528-21DE-4FAA-801E-634DDDAF4B2B}" type="slidenum">
+              <a:rPr lang="en-US" smtClean="0"/>
+              <a:pPr/>
+              <a:t>‹#›</a:t>
             </a:fld>
-            <a:endParaRPr lang="es-ES"/>
+            <a:endParaRPr lang="en-US"/>
           </a:p>
         </p:txBody>
       </p:sp>
     </p:spTree>
-    <p:extLst>
-      <p:ext uri="{BB962C8B-B14F-4D97-AF65-F5344CB8AC3E}">
-        <p14:creationId xmlns:p14="http://schemas.microsoft.com/office/powerpoint/2010/main" val="842124089"/>
-      </p:ext>
-    </p:extLst>
   </p:cSld>
   <p:clrMapOvr>
     <a:masterClrMapping/>
@@ -2191,7 +1918,7 @@
 
 <file path=ppt/slideLayouts/slideLayout7.xml><?xml version="1.0" encoding="utf-8"?>
 <p:sldLayout xmlns:a="http://schemas.openxmlformats.org/drawingml/2006/main" xmlns:r="http://schemas.openxmlformats.org/officeDocument/2006/relationships" xmlns:p="http://schemas.openxmlformats.org/presentationml/2006/main" type="blank" preserve="1">
-  <p:cSld name="En blanco">
+  <p:cSld name="Blank">
     <p:spTree>
       <p:nvGrpSpPr>
         <p:cNvPr id="1" name=""/>
@@ -2208,7 +1935,7 @@
       </p:grpSpPr>
       <p:sp>
         <p:nvSpPr>
-          <p:cNvPr id="2" name="Marcador de fecha 3"/>
+          <p:cNvPr id="2" name="Date Placeholder 1"/>
           <p:cNvSpPr>
             <a:spLocks noGrp="1"/>
           </p:cNvSpPr>
@@ -2219,29 +1946,20 @@
         <p:spPr/>
         <p:txBody>
           <a:bodyPr/>
-          <a:lstStyle>
-            <a:lvl1pPr>
-              <a:defRPr/>
-            </a:lvl1pPr>
-          </a:lstStyle>
-          <a:p>
-            <a:pPr>
-              <a:defRPr/>
-            </a:pPr>
-            <a:fld id="{1B9FF99A-56E2-5A4F-9818-CF31EA75EFCE}" type="datetimeFigureOut">
-              <a:rPr lang="es-ES"/>
-              <a:pPr>
-                <a:defRPr/>
-              </a:pPr>
-              <a:t>7/25/12</a:t>
+          <a:lstStyle/>
+          <a:p>
+            <a:fld id="{1D8BD707-D9CF-40AE-B4C6-C98DA3205C09}" type="datetimeFigureOut">
+              <a:rPr lang="en-US" smtClean="0"/>
+              <a:pPr/>
+              <a:t>9/18/2006</a:t>
             </a:fld>
-            <a:endParaRPr lang="es-ES"/>
-          </a:p>
-        </p:txBody>
-      </p:sp>
-      <p:sp>
-        <p:nvSpPr>
-          <p:cNvPr id="3" name="Marcador de pie de página 4"/>
+            <a:endParaRPr lang="en-US"/>
+          </a:p>
+        </p:txBody>
+      </p:sp>
+      <p:sp>
+        <p:nvSpPr>
+          <p:cNvPr id="3" name="Footer Placeholder 2"/>
           <p:cNvSpPr>
             <a:spLocks noGrp="1"/>
           </p:cNvSpPr>
@@ -2252,22 +1970,15 @@
         <p:spPr/>
         <p:txBody>
           <a:bodyPr/>
-          <a:lstStyle>
-            <a:lvl1pPr>
-              <a:defRPr/>
-            </a:lvl1pPr>
-          </a:lstStyle>
-          <a:p>
-            <a:pPr>
-              <a:defRPr/>
-            </a:pPr>
-            <a:endParaRPr lang="es-ES"/>
-          </a:p>
-        </p:txBody>
-      </p:sp>
-      <p:sp>
-        <p:nvSpPr>
-          <p:cNvPr id="4" name="Marcador de número de diapositiva 5"/>
+          <a:lstStyle/>
+          <a:p>
+            <a:endParaRPr lang="en-US"/>
+          </a:p>
+        </p:txBody>
+      </p:sp>
+      <p:sp>
+        <p:nvSpPr>
+          <p:cNvPr id="4" name="Slide Number Placeholder 3"/>
           <p:cNvSpPr>
             <a:spLocks noGrp="1"/>
           </p:cNvSpPr>
@@ -2278,32 +1989,18 @@
         <p:spPr/>
         <p:txBody>
           <a:bodyPr/>
-          <a:lstStyle>
-            <a:lvl1pPr>
-              <a:defRPr/>
-            </a:lvl1pPr>
-          </a:lstStyle>
-          <a:p>
-            <a:pPr>
-              <a:defRPr/>
-            </a:pPr>
-            <a:fld id="{5E287189-F138-494E-9097-6F2F0D4E57B4}" type="slidenum">
-              <a:rPr lang="es-ES"/>
-              <a:pPr>
-                <a:defRPr/>
-              </a:pPr>
-              <a:t>‹Nr.›</a:t>
+          <a:lstStyle/>
+          <a:p>
+            <a:fld id="{B6F15528-21DE-4FAA-801E-634DDDAF4B2B}" type="slidenum">
+              <a:rPr lang="en-US" smtClean="0"/>
+              <a:pPr/>
+              <a:t>‹#›</a:t>
             </a:fld>
-            <a:endParaRPr lang="es-ES"/>
+            <a:endParaRPr lang="en-US"/>
           </a:p>
         </p:txBody>
       </p:sp>
     </p:spTree>
-    <p:extLst>
-      <p:ext uri="{BB962C8B-B14F-4D97-AF65-F5344CB8AC3E}">
-        <p14:creationId xmlns:p14="http://schemas.microsoft.com/office/powerpoint/2010/main" val="2316341877"/>
-      </p:ext>
-    </p:extLst>
   </p:cSld>
   <p:clrMapOvr>
     <a:masterClrMapping/>
@@ -2313,7 +2010,7 @@
 
 <file path=ppt/slideLayouts/slideLayout8.xml><?xml version="1.0" encoding="utf-8"?>
 <p:sldLayout xmlns:a="http://schemas.openxmlformats.org/drawingml/2006/main" xmlns:r="http://schemas.openxmlformats.org/officeDocument/2006/relationships" xmlns:p="http://schemas.openxmlformats.org/presentationml/2006/main" type="objTx" preserve="1">
-  <p:cSld name="Contenido con título">
+  <p:cSld name="Content with Caption">
     <p:spTree>
       <p:nvGrpSpPr>
         <p:cNvPr id="1" name=""/>
@@ -2330,7 +2027,7 @@
       </p:grpSpPr>
       <p:sp>
         <p:nvSpPr>
-          <p:cNvPr id="2" name="Título 1"/>
+          <p:cNvPr id="2" name="Title 1"/>
           <p:cNvSpPr>
             <a:spLocks noGrp="1"/>
           </p:cNvSpPr>
@@ -2354,15 +2051,15 @@
           <a:p>
             <a:r>
               <a:rPr lang="en-US" smtClean="0"/>
-              <a:t>Clic para editar título</a:t>
-            </a:r>
-            <a:endParaRPr lang="es-ES"/>
-          </a:p>
-        </p:txBody>
-      </p:sp>
-      <p:sp>
-        <p:nvSpPr>
-          <p:cNvPr id="3" name="Marcador de contenido 2"/>
+              <a:t>Click to edit Master title style</a:t>
+            </a:r>
+            <a:endParaRPr lang="en-US"/>
+          </a:p>
+        </p:txBody>
+      </p:sp>
+      <p:sp>
+        <p:nvSpPr>
+          <p:cNvPr id="3" name="Content Placeholder 2"/>
           <p:cNvSpPr>
             <a:spLocks noGrp="1"/>
           </p:cNvSpPr>
@@ -2411,43 +2108,43 @@
             <a:pPr lvl="0"/>
             <a:r>
               <a:rPr lang="en-US" smtClean="0"/>
-              <a:t>Haga clic para modificar el estilo de texto del patrón</a:t>
+              <a:t>Click to edit Master text styles</a:t>
             </a:r>
           </a:p>
           <a:p>
             <a:pPr lvl="1"/>
             <a:r>
               <a:rPr lang="en-US" smtClean="0"/>
-              <a:t>Segundo nivel</a:t>
+              <a:t>Second level</a:t>
             </a:r>
           </a:p>
           <a:p>
             <a:pPr lvl="2"/>
             <a:r>
               <a:rPr lang="en-US" smtClean="0"/>
-              <a:t>Tercer nivel</a:t>
+              <a:t>Third level</a:t>
             </a:r>
           </a:p>
           <a:p>
             <a:pPr lvl="3"/>
             <a:r>
               <a:rPr lang="en-US" smtClean="0"/>
-              <a:t>Cuarto nivel</a:t>
+              <a:t>Fourth level</a:t>
             </a:r>
           </a:p>
           <a:p>
             <a:pPr lvl="4"/>
             <a:r>
               <a:rPr lang="en-US" smtClean="0"/>
-              <a:t>Quinto nivel</a:t>
-            </a:r>
-            <a:endParaRPr lang="es-ES"/>
-          </a:p>
-        </p:txBody>
-      </p:sp>
-      <p:sp>
-        <p:nvSpPr>
-          <p:cNvPr id="4" name="Marcador de texto 3"/>
+              <a:t>Fifth level</a:t>
+            </a:r>
+            <a:endParaRPr lang="en-US"/>
+          </a:p>
+        </p:txBody>
+      </p:sp>
+      <p:sp>
+        <p:nvSpPr>
+          <p:cNvPr id="4" name="Text Placeholder 3"/>
           <p:cNvSpPr>
             <a:spLocks noGrp="1"/>
           </p:cNvSpPr>
@@ -2505,14 +2202,14 @@
             <a:pPr lvl="0"/>
             <a:r>
               <a:rPr lang="en-US" smtClean="0"/>
-              <a:t>Haga clic para modificar el estilo de texto del patrón</a:t>
-            </a:r>
-          </a:p>
-        </p:txBody>
-      </p:sp>
-      <p:sp>
-        <p:nvSpPr>
-          <p:cNvPr id="5" name="Marcador de fecha 3"/>
+              <a:t>Click to edit Master text styles</a:t>
+            </a:r>
+          </a:p>
+        </p:txBody>
+      </p:sp>
+      <p:sp>
+        <p:nvSpPr>
+          <p:cNvPr id="5" name="Date Placeholder 4"/>
           <p:cNvSpPr>
             <a:spLocks noGrp="1"/>
           </p:cNvSpPr>
@@ -2523,29 +2220,20 @@
         <p:spPr/>
         <p:txBody>
           <a:bodyPr/>
-          <a:lstStyle>
-            <a:lvl1pPr>
-              <a:defRPr/>
-            </a:lvl1pPr>
-          </a:lstStyle>
-          <a:p>
-            <a:pPr>
-              <a:defRPr/>
-            </a:pPr>
-            <a:fld id="{108F862B-842F-274C-89AE-696357CB6976}" type="datetimeFigureOut">
-              <a:rPr lang="es-ES"/>
-              <a:pPr>
-                <a:defRPr/>
-              </a:pPr>
-              <a:t>7/25/12</a:t>
+          <a:lstStyle/>
+          <a:p>
+            <a:fld id="{1D8BD707-D9CF-40AE-B4C6-C98DA3205C09}" type="datetimeFigureOut">
+              <a:rPr lang="en-US" smtClean="0"/>
+              <a:pPr/>
+              <a:t>9/18/2006</a:t>
             </a:fld>
-            <a:endParaRPr lang="es-ES"/>
-          </a:p>
-        </p:txBody>
-      </p:sp>
-      <p:sp>
-        <p:nvSpPr>
-          <p:cNvPr id="6" name="Marcador de pie de página 4"/>
+            <a:endParaRPr lang="en-US"/>
+          </a:p>
+        </p:txBody>
+      </p:sp>
+      <p:sp>
+        <p:nvSpPr>
+          <p:cNvPr id="6" name="Footer Placeholder 5"/>
           <p:cNvSpPr>
             <a:spLocks noGrp="1"/>
           </p:cNvSpPr>
@@ -2556,22 +2244,15 @@
         <p:spPr/>
         <p:txBody>
           <a:bodyPr/>
-          <a:lstStyle>
-            <a:lvl1pPr>
-              <a:defRPr/>
-            </a:lvl1pPr>
-          </a:lstStyle>
-          <a:p>
-            <a:pPr>
-              <a:defRPr/>
-            </a:pPr>
-            <a:endParaRPr lang="es-ES"/>
-          </a:p>
-        </p:txBody>
-      </p:sp>
-      <p:sp>
-        <p:nvSpPr>
-          <p:cNvPr id="7" name="Marcador de número de diapositiva 5"/>
+          <a:lstStyle/>
+          <a:p>
+            <a:endParaRPr lang="en-US"/>
+          </a:p>
+        </p:txBody>
+      </p:sp>
+      <p:sp>
+        <p:nvSpPr>
+          <p:cNvPr id="7" name="Slide Number Placeholder 6"/>
           <p:cNvSpPr>
             <a:spLocks noGrp="1"/>
           </p:cNvSpPr>
@@ -2582,32 +2263,18 @@
         <p:spPr/>
         <p:txBody>
           <a:bodyPr/>
-          <a:lstStyle>
-            <a:lvl1pPr>
-              <a:defRPr/>
-            </a:lvl1pPr>
-          </a:lstStyle>
-          <a:p>
-            <a:pPr>
-              <a:defRPr/>
-            </a:pPr>
-            <a:fld id="{129E65B3-617F-6743-8F2F-DF72F41C56CB}" type="slidenum">
-              <a:rPr lang="es-ES"/>
-              <a:pPr>
-                <a:defRPr/>
-              </a:pPr>
-              <a:t>‹Nr.›</a:t>
+          <a:lstStyle/>
+          <a:p>
+            <a:fld id="{B6F15528-21DE-4FAA-801E-634DDDAF4B2B}" type="slidenum">
+              <a:rPr lang="en-US" smtClean="0"/>
+              <a:pPr/>
+              <a:t>‹#›</a:t>
             </a:fld>
-            <a:endParaRPr lang="es-ES"/>
+            <a:endParaRPr lang="en-US"/>
           </a:p>
         </p:txBody>
       </p:sp>
     </p:spTree>
-    <p:extLst>
-      <p:ext uri="{BB962C8B-B14F-4D97-AF65-F5344CB8AC3E}">
-        <p14:creationId xmlns:p14="http://schemas.microsoft.com/office/powerpoint/2010/main" val="1918162144"/>
-      </p:ext>
-    </p:extLst>
   </p:cSld>
   <p:clrMapOvr>
     <a:masterClrMapping/>
@@ -2617,7 +2284,7 @@
 
 <file path=ppt/slideLayouts/slideLayout9.xml><?xml version="1.0" encoding="utf-8"?>
 <p:sldLayout xmlns:a="http://schemas.openxmlformats.org/drawingml/2006/main" xmlns:r="http://schemas.openxmlformats.org/officeDocument/2006/relationships" xmlns:p="http://schemas.openxmlformats.org/presentationml/2006/main" type="picTx" preserve="1">
-  <p:cSld name="Imagen con título">
+  <p:cSld name="Picture with Caption">
     <p:spTree>
       <p:nvGrpSpPr>
         <p:cNvPr id="1" name=""/>
@@ -2634,7 +2301,7 @@
       </p:grpSpPr>
       <p:sp>
         <p:nvSpPr>
-          <p:cNvPr id="2" name="Título 1"/>
+          <p:cNvPr id="2" name="Title 1"/>
           <p:cNvSpPr>
             <a:spLocks noGrp="1"/>
           </p:cNvSpPr>
@@ -2658,15 +2325,15 @@
           <a:p>
             <a:r>
               <a:rPr lang="en-US" smtClean="0"/>
-              <a:t>Clic para editar título</a:t>
-            </a:r>
-            <a:endParaRPr lang="es-ES"/>
-          </a:p>
-        </p:txBody>
-      </p:sp>
-      <p:sp>
-        <p:nvSpPr>
-          <p:cNvPr id="3" name="Marcador de posición de imagen 2"/>
+              <a:t>Click to edit Master title style</a:t>
+            </a:r>
+            <a:endParaRPr lang="en-US"/>
+          </a:p>
+        </p:txBody>
+      </p:sp>
+      <p:sp>
+        <p:nvSpPr>
+          <p:cNvPr id="3" name="Picture Placeholder 2"/>
           <p:cNvSpPr>
             <a:spLocks noGrp="1"/>
           </p:cNvSpPr>
@@ -2681,9 +2348,7 @@
           </a:xfrm>
         </p:spPr>
         <p:txBody>
-          <a:bodyPr rtlCol="0">
-            <a:normAutofit/>
-          </a:bodyPr>
+          <a:bodyPr/>
           <a:lstStyle>
             <a:lvl1pPr marL="0" indent="0">
               <a:buNone/>
@@ -2723,14 +2388,13 @@
             </a:lvl9pPr>
           </a:lstStyle>
           <a:p>
-            <a:pPr lvl="0"/>
-            <a:endParaRPr lang="es-ES" noProof="0"/>
-          </a:p>
-        </p:txBody>
-      </p:sp>
-      <p:sp>
-        <p:nvSpPr>
-          <p:cNvPr id="4" name="Marcador de texto 3"/>
+            <a:endParaRPr lang="en-US"/>
+          </a:p>
+        </p:txBody>
+      </p:sp>
+      <p:sp>
+        <p:nvSpPr>
+          <p:cNvPr id="4" name="Text Placeholder 3"/>
           <p:cNvSpPr>
             <a:spLocks noGrp="1"/>
           </p:cNvSpPr>
@@ -2788,14 +2452,14 @@
             <a:pPr lvl="0"/>
             <a:r>
               <a:rPr lang="en-US" smtClean="0"/>
-              <a:t>Haga clic para modificar el estilo de texto del patrón</a:t>
-            </a:r>
-          </a:p>
-        </p:txBody>
-      </p:sp>
-      <p:sp>
-        <p:nvSpPr>
-          <p:cNvPr id="5" name="Marcador de fecha 3"/>
+              <a:t>Click to edit Master text styles</a:t>
+            </a:r>
+          </a:p>
+        </p:txBody>
+      </p:sp>
+      <p:sp>
+        <p:nvSpPr>
+          <p:cNvPr id="5" name="Date Placeholder 4"/>
           <p:cNvSpPr>
             <a:spLocks noGrp="1"/>
           </p:cNvSpPr>
@@ -2806,29 +2470,20 @@
         <p:spPr/>
         <p:txBody>
           <a:bodyPr/>
-          <a:lstStyle>
-            <a:lvl1pPr>
-              <a:defRPr/>
-            </a:lvl1pPr>
-          </a:lstStyle>
-          <a:p>
-            <a:pPr>
-              <a:defRPr/>
-            </a:pPr>
-            <a:fld id="{F1189CBB-790D-4F41-A800-8E1CA7947892}" type="datetimeFigureOut">
-              <a:rPr lang="es-ES"/>
-              <a:pPr>
-                <a:defRPr/>
-              </a:pPr>
-              <a:t>7/25/12</a:t>
+          <a:lstStyle/>
+          <a:p>
+            <a:fld id="{1D8BD707-D9CF-40AE-B4C6-C98DA3205C09}" type="datetimeFigureOut">
+              <a:rPr lang="en-US" smtClean="0"/>
+              <a:pPr/>
+              <a:t>9/18/2006</a:t>
             </a:fld>
-            <a:endParaRPr lang="es-ES"/>
-          </a:p>
-        </p:txBody>
-      </p:sp>
-      <p:sp>
-        <p:nvSpPr>
-          <p:cNvPr id="6" name="Marcador de pie de página 4"/>
+            <a:endParaRPr lang="en-US"/>
+          </a:p>
+        </p:txBody>
+      </p:sp>
+      <p:sp>
+        <p:nvSpPr>
+          <p:cNvPr id="6" name="Footer Placeholder 5"/>
           <p:cNvSpPr>
             <a:spLocks noGrp="1"/>
           </p:cNvSpPr>
@@ -2839,22 +2494,15 @@
         <p:spPr/>
         <p:txBody>
           <a:bodyPr/>
-          <a:lstStyle>
-            <a:lvl1pPr>
-              <a:defRPr/>
-            </a:lvl1pPr>
-          </a:lstStyle>
-          <a:p>
-            <a:pPr>
-              <a:defRPr/>
-            </a:pPr>
-            <a:endParaRPr lang="es-ES"/>
-          </a:p>
-        </p:txBody>
-      </p:sp>
-      <p:sp>
-        <p:nvSpPr>
-          <p:cNvPr id="7" name="Marcador de número de diapositiva 5"/>
+          <a:lstStyle/>
+          <a:p>
+            <a:endParaRPr lang="en-US"/>
+          </a:p>
+        </p:txBody>
+      </p:sp>
+      <p:sp>
+        <p:nvSpPr>
+          <p:cNvPr id="7" name="Slide Number Placeholder 6"/>
           <p:cNvSpPr>
             <a:spLocks noGrp="1"/>
           </p:cNvSpPr>
@@ -2865,32 +2513,18 @@
         <p:spPr/>
         <p:txBody>
           <a:bodyPr/>
-          <a:lstStyle>
-            <a:lvl1pPr>
-              <a:defRPr/>
-            </a:lvl1pPr>
-          </a:lstStyle>
-          <a:p>
-            <a:pPr>
-              <a:defRPr/>
-            </a:pPr>
-            <a:fld id="{C1ED3ED7-3625-4449-9402-5ECB07B4A228}" type="slidenum">
-              <a:rPr lang="es-ES"/>
-              <a:pPr>
-                <a:defRPr/>
-              </a:pPr>
-              <a:t>‹Nr.›</a:t>
+          <a:lstStyle/>
+          <a:p>
+            <a:fld id="{B6F15528-21DE-4FAA-801E-634DDDAF4B2B}" type="slidenum">
+              <a:rPr lang="en-US" smtClean="0"/>
+              <a:pPr/>
+              <a:t>‹#›</a:t>
             </a:fld>
-            <a:endParaRPr lang="es-ES"/>
+            <a:endParaRPr lang="en-US"/>
           </a:p>
         </p:txBody>
       </p:sp>
     </p:spTree>
-    <p:extLst>
-      <p:ext uri="{BB962C8B-B14F-4D97-AF65-F5344CB8AC3E}">
-        <p14:creationId xmlns:p14="http://schemas.microsoft.com/office/powerpoint/2010/main" val="1323680275"/>
-      </p:ext>
-    </p:extLst>
   </p:cSld>
   <p:clrMapOvr>
     <a:masterClrMapping/>
@@ -2922,7 +2556,7 @@
       </p:grpSpPr>
       <p:sp>
         <p:nvSpPr>
-          <p:cNvPr id="1026" name="Marcador de título 1"/>
+          <p:cNvPr id="2" name="Title Placeholder 1"/>
           <p:cNvSpPr>
             <a:spLocks noGrp="1"/>
           </p:cNvSpPr>
@@ -2930,7 +2564,7 @@
             <p:ph type="title"/>
           </p:nvPr>
         </p:nvSpPr>
-        <p:spPr bwMode="auto">
+        <p:spPr>
           <a:xfrm>
             <a:off x="457200" y="274638"/>
             <a:ext cx="8229600" cy="1143000"/>
@@ -2938,53 +2572,24 @@
           <a:prstGeom prst="rect">
             <a:avLst/>
           </a:prstGeom>
-          <a:noFill/>
-          <a:ln>
-            <a:noFill/>
-          </a:ln>
-          <a:extLst>
-            <a:ext uri="{909E8E84-426E-40dd-AFC4-6F175D3DCCD1}">
-              <a14:hiddenFill xmlns:a14="http://schemas.microsoft.com/office/drawing/2010/main">
-                <a:solidFill>
-                  <a:srgbClr val="FFFFFF"/>
-                </a:solidFill>
-              </a14:hiddenFill>
-            </a:ext>
-            <a:ext uri="{91240B29-F687-4f45-9708-019B960494DF}">
-              <a14:hiddenLine xmlns:a14="http://schemas.microsoft.com/office/drawing/2010/main" w="9525">
-                <a:solidFill>
-                  <a:srgbClr val="000000"/>
-                </a:solidFill>
-                <a:miter lim="800000"/>
-                <a:headEnd/>
-                <a:tailEnd/>
-              </a14:hiddenLine>
-            </a:ext>
-            <a:ext uri="{FAA26D3D-D897-4be2-8F04-BA451C77F1D7}">
-              <ma14:placeholderFlag xmlns:ma14="http://schemas.microsoft.com/office/mac/drawingml/2011/main" val="1"/>
-            </a:ext>
-          </a:extLst>
         </p:spPr>
         <p:txBody>
-          <a:bodyPr vert="horz" wrap="square" lIns="91440" tIns="45720" rIns="91440" bIns="45720" numCol="1" anchor="ctr" anchorCtr="0" compatLnSpc="1">
-            <a:prstTxWarp prst="textNoShape">
-              <a:avLst/>
-            </a:prstTxWarp>
+          <a:bodyPr vert="horz" lIns="91440" tIns="45720" rIns="91440" bIns="45720" rtlCol="0" anchor="ctr">
+            <a:normAutofit/>
           </a:bodyPr>
           <a:lstStyle/>
           <a:p>
-            <a:pPr lvl="0"/>
-            <a:r>
-              <a:rPr lang="en-US"/>
-              <a:t>Clic para editar título</a:t>
-            </a:r>
-            <a:endParaRPr lang="es-ES"/>
-          </a:p>
-        </p:txBody>
-      </p:sp>
-      <p:sp>
-        <p:nvSpPr>
-          <p:cNvPr id="1027" name="Marcador de texto 2"/>
+            <a:r>
+              <a:rPr lang="en-US" smtClean="0"/>
+              <a:t>Click to edit Master title style</a:t>
+            </a:r>
+            <a:endParaRPr lang="en-US"/>
+          </a:p>
+        </p:txBody>
+      </p:sp>
+      <p:sp>
+        <p:nvSpPr>
+          <p:cNvPr id="3" name="Text Placeholder 2"/>
           <p:cNvSpPr>
             <a:spLocks noGrp="1"/>
           </p:cNvSpPr>
@@ -2992,7 +2597,7 @@
             <p:ph type="body" idx="1"/>
           </p:nvPr>
         </p:nvSpPr>
-        <p:spPr bwMode="auto">
+        <p:spPr>
           <a:xfrm>
             <a:off x="457200" y="1600200"/>
             <a:ext cx="8229600" cy="4525963"/>
@@ -3000,81 +2605,53 @@
           <a:prstGeom prst="rect">
             <a:avLst/>
           </a:prstGeom>
-          <a:noFill/>
-          <a:ln>
-            <a:noFill/>
-          </a:ln>
-          <a:extLst>
-            <a:ext uri="{909E8E84-426E-40dd-AFC4-6F175D3DCCD1}">
-              <a14:hiddenFill xmlns:a14="http://schemas.microsoft.com/office/drawing/2010/main">
-                <a:solidFill>
-                  <a:srgbClr val="FFFFFF"/>
-                </a:solidFill>
-              </a14:hiddenFill>
-            </a:ext>
-            <a:ext uri="{91240B29-F687-4f45-9708-019B960494DF}">
-              <a14:hiddenLine xmlns:a14="http://schemas.microsoft.com/office/drawing/2010/main" w="9525">
-                <a:solidFill>
-                  <a:srgbClr val="000000"/>
-                </a:solidFill>
-                <a:miter lim="800000"/>
-                <a:headEnd/>
-                <a:tailEnd/>
-              </a14:hiddenLine>
-            </a:ext>
-            <a:ext uri="{FAA26D3D-D897-4be2-8F04-BA451C77F1D7}">
-              <ma14:placeholderFlag xmlns:ma14="http://schemas.microsoft.com/office/mac/drawingml/2011/main" val="1"/>
-            </a:ext>
-          </a:extLst>
         </p:spPr>
         <p:txBody>
-          <a:bodyPr vert="horz" wrap="square" lIns="91440" tIns="45720" rIns="91440" bIns="45720" numCol="1" anchor="t" anchorCtr="0" compatLnSpc="1">
-            <a:prstTxWarp prst="textNoShape">
-              <a:avLst/>
-            </a:prstTxWarp>
+          <a:bodyPr vert="horz" lIns="91440" tIns="45720" rIns="91440" bIns="45720" rtlCol="0">
+            <a:normAutofit/>
           </a:bodyPr>
           <a:lstStyle/>
           <a:p>
             <a:pPr lvl="0"/>
             <a:r>
-              <a:rPr lang="en-US"/>
-              <a:t>Haga clic para modificar el estilo de texto del patrón</a:t>
+              <a:rPr lang="en-US" smtClean="0"/>
+              <a:t>Click to edit Master text styles</a:t>
             </a:r>
           </a:p>
           <a:p>
             <a:pPr lvl="1"/>
             <a:r>
-              <a:rPr lang="en-US"/>
-              <a:t>Segundo nivel</a:t>
+              <a:rPr lang="en-US" smtClean="0"/>
+              <a:t>Second level</a:t>
             </a:r>
           </a:p>
           <a:p>
             <a:pPr lvl="2"/>
             <a:r>
-              <a:rPr lang="en-US"/>
-              <a:t>Tercer nivel</a:t>
+              <a:rPr lang="en-US" smtClean="0"/>
+              <a:t>Third level</a:t>
             </a:r>
           </a:p>
           <a:p>
             <a:pPr lvl="3"/>
             <a:r>
-              <a:rPr lang="en-US"/>
-              <a:t>Cuarto nivel</a:t>
+              <a:rPr lang="en-US" smtClean="0"/>
+              <a:t>Fourth level</a:t>
             </a:r>
           </a:p>
           <a:p>
             <a:pPr lvl="4"/>
             <a:r>
-              <a:rPr lang="en-US"/>
-              <a:t>Quinto nivel</a:t>
-            </a:r>
-            <a:endParaRPr lang="es-ES"/>
-          </a:p>
-        </p:txBody>
-      </p:sp>
-      <p:sp>
-        <p:nvSpPr>
-          <p:cNvPr id="4" name="Marcador de fecha 3"/>
+              <a:rPr lang="en-US" smtClean="0"/>
+              <a:t>Fifth level</a:t>
+            </a:r>
+            <a:endParaRPr lang="en-US"/>
+          </a:p>
+        </p:txBody>
+      </p:sp>
+      <p:sp>
+        <p:nvSpPr>
+          <p:cNvPr id="4" name="Date Placeholder 3"/>
           <p:cNvSpPr>
             <a:spLocks noGrp="1"/>
           </p:cNvSpPr>
@@ -3094,43 +2671,29 @@
         <p:txBody>
           <a:bodyPr vert="horz" lIns="91440" tIns="45720" rIns="91440" bIns="45720" rtlCol="0" anchor="ctr"/>
           <a:lstStyle>
-            <a:lvl1pPr algn="l" fontAlgn="auto">
-              <a:spcBef>
-                <a:spcPts val="0"/>
-              </a:spcBef>
-              <a:spcAft>
-                <a:spcPts val="0"/>
-              </a:spcAft>
-              <a:defRPr sz="1200" smtClean="0">
+            <a:lvl1pPr algn="l">
+              <a:defRPr sz="1200">
                 <a:solidFill>
                   <a:schemeClr val="tx1">
                     <a:tint val="75000"/>
                   </a:schemeClr>
                 </a:solidFill>
-                <a:latin typeface="+mn-lt"/>
-                <a:ea typeface="+mn-ea"/>
-                <a:cs typeface="+mn-cs"/>
               </a:defRPr>
             </a:lvl1pPr>
           </a:lstStyle>
           <a:p>
-            <a:pPr>
-              <a:defRPr/>
-            </a:pPr>
-            <a:fld id="{4152D8CA-6EE4-2C45-BC7B-B31F402BDD16}" type="datetimeFigureOut">
-              <a:rPr lang="es-ES"/>
-              <a:pPr>
-                <a:defRPr/>
-              </a:pPr>
-              <a:t>7/25/12</a:t>
+            <a:fld id="{1D8BD707-D9CF-40AE-B4C6-C98DA3205C09}" type="datetimeFigureOut">
+              <a:rPr lang="en-US" smtClean="0"/>
+              <a:pPr/>
+              <a:t>9/18/2006</a:t>
             </a:fld>
-            <a:endParaRPr lang="es-ES"/>
-          </a:p>
-        </p:txBody>
-      </p:sp>
-      <p:sp>
-        <p:nvSpPr>
-          <p:cNvPr id="5" name="Marcador de pie de página 4"/>
+            <a:endParaRPr lang="en-US"/>
+          </a:p>
+        </p:txBody>
+      </p:sp>
+      <p:sp>
+        <p:nvSpPr>
+          <p:cNvPr id="5" name="Footer Placeholder 4"/>
           <p:cNvSpPr>
             <a:spLocks noGrp="1"/>
           </p:cNvSpPr>
@@ -3150,36 +2713,24 @@
         <p:txBody>
           <a:bodyPr vert="horz" lIns="91440" tIns="45720" rIns="91440" bIns="45720" rtlCol="0" anchor="ctr"/>
           <a:lstStyle>
-            <a:lvl1pPr algn="ctr" fontAlgn="auto">
-              <a:spcBef>
-                <a:spcPts val="0"/>
-              </a:spcBef>
-              <a:spcAft>
-                <a:spcPts val="0"/>
-              </a:spcAft>
+            <a:lvl1pPr algn="ctr">
               <a:defRPr sz="1200">
                 <a:solidFill>
                   <a:schemeClr val="tx1">
                     <a:tint val="75000"/>
                   </a:schemeClr>
                 </a:solidFill>
-                <a:latin typeface="+mn-lt"/>
-                <a:ea typeface="+mn-ea"/>
-                <a:cs typeface="+mn-cs"/>
               </a:defRPr>
             </a:lvl1pPr>
           </a:lstStyle>
           <a:p>
-            <a:pPr>
-              <a:defRPr/>
-            </a:pPr>
-            <a:endParaRPr lang="es-ES"/>
-          </a:p>
-        </p:txBody>
-      </p:sp>
-      <p:sp>
-        <p:nvSpPr>
-          <p:cNvPr id="6" name="Marcador de número de diapositiva 5"/>
+            <a:endParaRPr lang="en-US"/>
+          </a:p>
+        </p:txBody>
+      </p:sp>
+      <p:sp>
+        <p:nvSpPr>
+          <p:cNvPr id="6" name="Slide Number Placeholder 5"/>
           <p:cNvSpPr>
             <a:spLocks noGrp="1"/>
           </p:cNvSpPr>
@@ -3199,37 +2750,23 @@
         <p:txBody>
           <a:bodyPr vert="horz" lIns="91440" tIns="45720" rIns="91440" bIns="45720" rtlCol="0" anchor="ctr"/>
           <a:lstStyle>
-            <a:lvl1pPr algn="r" fontAlgn="auto">
-              <a:spcBef>
-                <a:spcPts val="0"/>
-              </a:spcBef>
-              <a:spcAft>
-                <a:spcPts val="0"/>
-              </a:spcAft>
-              <a:defRPr sz="1200" smtClean="0">
+            <a:lvl1pPr algn="r">
+              <a:defRPr sz="1200">
                 <a:solidFill>
                   <a:schemeClr val="tx1">
                     <a:tint val="75000"/>
                   </a:schemeClr>
                 </a:solidFill>
-                <a:latin typeface="+mn-lt"/>
-                <a:ea typeface="+mn-ea"/>
-                <a:cs typeface="+mn-cs"/>
               </a:defRPr>
             </a:lvl1pPr>
           </a:lstStyle>
           <a:p>
-            <a:pPr>
-              <a:defRPr/>
-            </a:pPr>
-            <a:fld id="{8A44A990-4AB3-694F-9A55-99725E2C72B4}" type="slidenum">
-              <a:rPr lang="es-ES"/>
-              <a:pPr>
-                <a:defRPr/>
-              </a:pPr>
-              <a:t>‹Nr.›</a:t>
+            <a:fld id="{B6F15528-21DE-4FAA-801E-634DDDAF4B2B}" type="slidenum">
+              <a:rPr lang="en-US" smtClean="0"/>
+              <a:pPr/>
+              <a:t>‹#›</a:t>
             </a:fld>
-            <a:endParaRPr lang="es-ES"/>
+            <a:endParaRPr lang="en-US"/>
           </a:p>
         </p:txBody>
       </p:sp>
@@ -3251,247 +2788,102 @@
   </p:sldLayoutIdLst>
   <p:txStyles>
     <p:titleStyle>
-      <a:lvl1pPr algn="ctr" defTabSz="457200" rtl="0" fontAlgn="base">
+      <a:lvl1pPr algn="ctr" defTabSz="914400" rtl="0" eaLnBrk="1" latinLnBrk="0" hangingPunct="1">
         <a:spcBef>
           <a:spcPct val="0"/>
         </a:spcBef>
-        <a:spcAft>
-          <a:spcPct val="0"/>
-        </a:spcAft>
+        <a:buNone/>
         <a:defRPr sz="4400" kern="1200">
           <a:solidFill>
             <a:schemeClr val="tx1"/>
           </a:solidFill>
           <a:latin typeface="+mj-lt"/>
-          <a:ea typeface="ＭＳ Ｐゴシック" charset="0"/>
-          <a:cs typeface="ＭＳ Ｐゴシック" charset="0"/>
+          <a:ea typeface="+mj-ea"/>
+          <a:cs typeface="+mj-cs"/>
         </a:defRPr>
       </a:lvl1pPr>
-      <a:lvl2pPr algn="ctr" defTabSz="457200" rtl="0" fontAlgn="base">
-        <a:spcBef>
-          <a:spcPct val="0"/>
-        </a:spcBef>
-        <a:spcAft>
-          <a:spcPct val="0"/>
-        </a:spcAft>
-        <a:defRPr sz="4400">
-          <a:solidFill>
-            <a:schemeClr val="tx1"/>
-          </a:solidFill>
-          <a:latin typeface="Calibri" charset="0"/>
-          <a:ea typeface="ＭＳ Ｐゴシック" charset="0"/>
-          <a:cs typeface="ＭＳ Ｐゴシック" charset="0"/>
-        </a:defRPr>
-      </a:lvl2pPr>
-      <a:lvl3pPr algn="ctr" defTabSz="457200" rtl="0" fontAlgn="base">
-        <a:spcBef>
-          <a:spcPct val="0"/>
-        </a:spcBef>
-        <a:spcAft>
-          <a:spcPct val="0"/>
-        </a:spcAft>
-        <a:defRPr sz="4400">
-          <a:solidFill>
-            <a:schemeClr val="tx1"/>
-          </a:solidFill>
-          <a:latin typeface="Calibri" charset="0"/>
-          <a:ea typeface="ＭＳ Ｐゴシック" charset="0"/>
-          <a:cs typeface="ＭＳ Ｐゴシック" charset="0"/>
-        </a:defRPr>
-      </a:lvl3pPr>
-      <a:lvl4pPr algn="ctr" defTabSz="457200" rtl="0" fontAlgn="base">
-        <a:spcBef>
-          <a:spcPct val="0"/>
-        </a:spcBef>
-        <a:spcAft>
-          <a:spcPct val="0"/>
-        </a:spcAft>
-        <a:defRPr sz="4400">
-          <a:solidFill>
-            <a:schemeClr val="tx1"/>
-          </a:solidFill>
-          <a:latin typeface="Calibri" charset="0"/>
-          <a:ea typeface="ＭＳ Ｐゴシック" charset="0"/>
-          <a:cs typeface="ＭＳ Ｐゴシック" charset="0"/>
-        </a:defRPr>
-      </a:lvl4pPr>
-      <a:lvl5pPr algn="ctr" defTabSz="457200" rtl="0" fontAlgn="base">
-        <a:spcBef>
-          <a:spcPct val="0"/>
-        </a:spcBef>
-        <a:spcAft>
-          <a:spcPct val="0"/>
-        </a:spcAft>
-        <a:defRPr sz="4400">
-          <a:solidFill>
-            <a:schemeClr val="tx1"/>
-          </a:solidFill>
-          <a:latin typeface="Calibri" charset="0"/>
-          <a:ea typeface="ＭＳ Ｐゴシック" charset="0"/>
-          <a:cs typeface="ＭＳ Ｐゴシック" charset="0"/>
-        </a:defRPr>
-      </a:lvl5pPr>
-      <a:lvl6pPr marL="457200" algn="ctr" defTabSz="457200" rtl="0" fontAlgn="base">
-        <a:spcBef>
-          <a:spcPct val="0"/>
-        </a:spcBef>
-        <a:spcAft>
-          <a:spcPct val="0"/>
-        </a:spcAft>
-        <a:defRPr sz="4400">
-          <a:solidFill>
-            <a:schemeClr val="tx1"/>
-          </a:solidFill>
-          <a:latin typeface="Calibri" charset="0"/>
-          <a:ea typeface="ＭＳ Ｐゴシック" charset="0"/>
-          <a:cs typeface="ＭＳ Ｐゴシック" charset="0"/>
-        </a:defRPr>
-      </a:lvl6pPr>
-      <a:lvl7pPr marL="914400" algn="ctr" defTabSz="457200" rtl="0" fontAlgn="base">
-        <a:spcBef>
-          <a:spcPct val="0"/>
-        </a:spcBef>
-        <a:spcAft>
-          <a:spcPct val="0"/>
-        </a:spcAft>
-        <a:defRPr sz="4400">
-          <a:solidFill>
-            <a:schemeClr val="tx1"/>
-          </a:solidFill>
-          <a:latin typeface="Calibri" charset="0"/>
-          <a:ea typeface="ＭＳ Ｐゴシック" charset="0"/>
-          <a:cs typeface="ＭＳ Ｐゴシック" charset="0"/>
-        </a:defRPr>
-      </a:lvl7pPr>
-      <a:lvl8pPr marL="1371600" algn="ctr" defTabSz="457200" rtl="0" fontAlgn="base">
-        <a:spcBef>
-          <a:spcPct val="0"/>
-        </a:spcBef>
-        <a:spcAft>
-          <a:spcPct val="0"/>
-        </a:spcAft>
-        <a:defRPr sz="4400">
-          <a:solidFill>
-            <a:schemeClr val="tx1"/>
-          </a:solidFill>
-          <a:latin typeface="Calibri" charset="0"/>
-          <a:ea typeface="ＭＳ Ｐゴシック" charset="0"/>
-          <a:cs typeface="ＭＳ Ｐゴシック" charset="0"/>
-        </a:defRPr>
-      </a:lvl8pPr>
-      <a:lvl9pPr marL="1828800" algn="ctr" defTabSz="457200" rtl="0" fontAlgn="base">
-        <a:spcBef>
-          <a:spcPct val="0"/>
-        </a:spcBef>
-        <a:spcAft>
-          <a:spcPct val="0"/>
-        </a:spcAft>
-        <a:defRPr sz="4400">
-          <a:solidFill>
-            <a:schemeClr val="tx1"/>
-          </a:solidFill>
-          <a:latin typeface="Calibri" charset="0"/>
-          <a:ea typeface="ＭＳ Ｐゴシック" charset="0"/>
-          <a:cs typeface="ＭＳ Ｐゴシック" charset="0"/>
-        </a:defRPr>
-      </a:lvl9pPr>
     </p:titleStyle>
     <p:bodyStyle>
-      <a:lvl1pPr marL="342900" indent="-342900" algn="l" defTabSz="457200" rtl="0" fontAlgn="base">
+      <a:lvl1pPr marL="342900" indent="-342900" algn="l" defTabSz="914400" rtl="0" eaLnBrk="1" latinLnBrk="0" hangingPunct="1">
         <a:spcBef>
           <a:spcPct val="20000"/>
         </a:spcBef>
-        <a:spcAft>
-          <a:spcPct val="0"/>
-        </a:spcAft>
-        <a:buFont typeface="Arial" charset="0"/>
+        <a:buFont typeface="Arial" pitchFamily="34" charset="0"/>
         <a:buChar char="•"/>
         <a:defRPr sz="3200" kern="1200">
           <a:solidFill>
             <a:schemeClr val="tx1"/>
           </a:solidFill>
           <a:latin typeface="+mn-lt"/>
-          <a:ea typeface="ＭＳ Ｐゴシック" charset="0"/>
-          <a:cs typeface="ＭＳ Ｐゴシック" charset="0"/>
+          <a:ea typeface="+mn-ea"/>
+          <a:cs typeface="+mn-cs"/>
         </a:defRPr>
       </a:lvl1pPr>
-      <a:lvl2pPr marL="742950" indent="-285750" algn="l" defTabSz="457200" rtl="0" fontAlgn="base">
+      <a:lvl2pPr marL="742950" indent="-285750" algn="l" defTabSz="914400" rtl="0" eaLnBrk="1" latinLnBrk="0" hangingPunct="1">
         <a:spcBef>
           <a:spcPct val="20000"/>
         </a:spcBef>
-        <a:spcAft>
-          <a:spcPct val="0"/>
-        </a:spcAft>
-        <a:buFont typeface="Arial" charset="0"/>
+        <a:buFont typeface="Arial" pitchFamily="34" charset="0"/>
         <a:buChar char="–"/>
         <a:defRPr sz="2800" kern="1200">
           <a:solidFill>
             <a:schemeClr val="tx1"/>
           </a:solidFill>
           <a:latin typeface="+mn-lt"/>
-          <a:ea typeface="ＭＳ Ｐゴシック" charset="0"/>
+          <a:ea typeface="+mn-ea"/>
           <a:cs typeface="+mn-cs"/>
         </a:defRPr>
       </a:lvl2pPr>
-      <a:lvl3pPr marL="1143000" indent="-228600" algn="l" defTabSz="457200" rtl="0" fontAlgn="base">
+      <a:lvl3pPr marL="1143000" indent="-228600" algn="l" defTabSz="914400" rtl="0" eaLnBrk="1" latinLnBrk="0" hangingPunct="1">
         <a:spcBef>
           <a:spcPct val="20000"/>
         </a:spcBef>
-        <a:spcAft>
-          <a:spcPct val="0"/>
-        </a:spcAft>
-        <a:buFont typeface="Arial" charset="0"/>
+        <a:buFont typeface="Arial" pitchFamily="34" charset="0"/>
         <a:buChar char="•"/>
         <a:defRPr sz="2400" kern="1200">
           <a:solidFill>
             <a:schemeClr val="tx1"/>
           </a:solidFill>
           <a:latin typeface="+mn-lt"/>
-          <a:ea typeface="ＭＳ Ｐゴシック" charset="0"/>
+          <a:ea typeface="+mn-ea"/>
           <a:cs typeface="+mn-cs"/>
         </a:defRPr>
       </a:lvl3pPr>
-      <a:lvl4pPr marL="1600200" indent="-228600" algn="l" defTabSz="457200" rtl="0" fontAlgn="base">
+      <a:lvl4pPr marL="1600200" indent="-228600" algn="l" defTabSz="914400" rtl="0" eaLnBrk="1" latinLnBrk="0" hangingPunct="1">
         <a:spcBef>
           <a:spcPct val="20000"/>
         </a:spcBef>
-        <a:spcAft>
-          <a:spcPct val="0"/>
-        </a:spcAft>
-        <a:buFont typeface="Arial" charset="0"/>
+        <a:buFont typeface="Arial" pitchFamily="34" charset="0"/>
         <a:buChar char="–"/>
         <a:defRPr sz="2000" kern="1200">
           <a:solidFill>
             <a:schemeClr val="tx1"/>
           </a:solidFill>
           <a:latin typeface="+mn-lt"/>
-          <a:ea typeface="ＭＳ Ｐゴシック" charset="0"/>
+          <a:ea typeface="+mn-ea"/>
           <a:cs typeface="+mn-cs"/>
         </a:defRPr>
       </a:lvl4pPr>
-      <a:lvl5pPr marL="2057400" indent="-228600" algn="l" defTabSz="457200" rtl="0" fontAlgn="base">
+      <a:lvl5pPr marL="2057400" indent="-228600" algn="l" defTabSz="914400" rtl="0" eaLnBrk="1" latinLnBrk="0" hangingPunct="1">
         <a:spcBef>
           <a:spcPct val="20000"/>
         </a:spcBef>
-        <a:spcAft>
-          <a:spcPct val="0"/>
-        </a:spcAft>
-        <a:buFont typeface="Arial" charset="0"/>
+        <a:buFont typeface="Arial" pitchFamily="34" charset="0"/>
         <a:buChar char="»"/>
         <a:defRPr sz="2000" kern="1200">
           <a:solidFill>
             <a:schemeClr val="tx1"/>
           </a:solidFill>
           <a:latin typeface="+mn-lt"/>
-          <a:ea typeface="ＭＳ Ｐゴシック" charset="0"/>
+          <a:ea typeface="+mn-ea"/>
           <a:cs typeface="+mn-cs"/>
         </a:defRPr>
       </a:lvl5pPr>
-      <a:lvl6pPr marL="2514600" indent="-228600" algn="l" defTabSz="457200" rtl="0" eaLnBrk="1" latinLnBrk="0" hangingPunct="1">
+      <a:lvl6pPr marL="2514600" indent="-228600" algn="l" defTabSz="914400" rtl="0" eaLnBrk="1" latinLnBrk="0" hangingPunct="1">
         <a:spcBef>
           <a:spcPct val="20000"/>
         </a:spcBef>
-        <a:buFont typeface="Arial"/>
+        <a:buFont typeface="Arial" pitchFamily="34" charset="0"/>
         <a:buChar char="•"/>
         <a:defRPr sz="2000" kern="1200">
           <a:solidFill>
@@ -3502,11 +2894,11 @@
           <a:cs typeface="+mn-cs"/>
         </a:defRPr>
       </a:lvl6pPr>
-      <a:lvl7pPr marL="2971800" indent="-228600" algn="l" defTabSz="457200" rtl="0" eaLnBrk="1" latinLnBrk="0" hangingPunct="1">
+      <a:lvl7pPr marL="2971800" indent="-228600" algn="l" defTabSz="914400" rtl="0" eaLnBrk="1" latinLnBrk="0" hangingPunct="1">
         <a:spcBef>
           <a:spcPct val="20000"/>
         </a:spcBef>
-        <a:buFont typeface="Arial"/>
+        <a:buFont typeface="Arial" pitchFamily="34" charset="0"/>
         <a:buChar char="•"/>
         <a:defRPr sz="2000" kern="1200">
           <a:solidFill>
@@ -3517,11 +2909,11 @@
           <a:cs typeface="+mn-cs"/>
         </a:defRPr>
       </a:lvl7pPr>
-      <a:lvl8pPr marL="3429000" indent="-228600" algn="l" defTabSz="457200" rtl="0" eaLnBrk="1" latinLnBrk="0" hangingPunct="1">
+      <a:lvl8pPr marL="3429000" indent="-228600" algn="l" defTabSz="914400" rtl="0" eaLnBrk="1" latinLnBrk="0" hangingPunct="1">
         <a:spcBef>
           <a:spcPct val="20000"/>
         </a:spcBef>
-        <a:buFont typeface="Arial"/>
+        <a:buFont typeface="Arial" pitchFamily="34" charset="0"/>
         <a:buChar char="•"/>
         <a:defRPr sz="2000" kern="1200">
           <a:solidFill>
@@ -3532,11 +2924,11 @@
           <a:cs typeface="+mn-cs"/>
         </a:defRPr>
       </a:lvl8pPr>
-      <a:lvl9pPr marL="3886200" indent="-228600" algn="l" defTabSz="457200" rtl="0" eaLnBrk="1" latinLnBrk="0" hangingPunct="1">
+      <a:lvl9pPr marL="3886200" indent="-228600" algn="l" defTabSz="914400" rtl="0" eaLnBrk="1" latinLnBrk="0" hangingPunct="1">
         <a:spcBef>
           <a:spcPct val="20000"/>
         </a:spcBef>
-        <a:buFont typeface="Arial"/>
+        <a:buFont typeface="Arial" pitchFamily="34" charset="0"/>
         <a:buChar char="•"/>
         <a:defRPr sz="2000" kern="1200">
           <a:solidFill>
@@ -3550,9 +2942,9 @@
     </p:bodyStyle>
     <p:otherStyle>
       <a:defPPr>
-        <a:defRPr lang="es-ES"/>
+        <a:defRPr lang="en-US"/>
       </a:defPPr>
-      <a:lvl1pPr marL="0" algn="l" defTabSz="457200" rtl="0" eaLnBrk="1" latinLnBrk="0" hangingPunct="1">
+      <a:lvl1pPr marL="0" algn="l" defTabSz="914400" rtl="0" eaLnBrk="1" latinLnBrk="0" hangingPunct="1">
         <a:defRPr sz="1800" kern="1200">
           <a:solidFill>
             <a:schemeClr val="tx1"/>
@@ -3562,7 +2954,7 @@
           <a:cs typeface="+mn-cs"/>
         </a:defRPr>
       </a:lvl1pPr>
-      <a:lvl2pPr marL="457200" algn="l" defTabSz="457200" rtl="0" eaLnBrk="1" latinLnBrk="0" hangingPunct="1">
+      <a:lvl2pPr marL="457200" algn="l" defTabSz="914400" rtl="0" eaLnBrk="1" latinLnBrk="0" hangingPunct="1">
         <a:defRPr sz="1800" kern="1200">
           <a:solidFill>
             <a:schemeClr val="tx1"/>
@@ -3572,7 +2964,7 @@
           <a:cs typeface="+mn-cs"/>
         </a:defRPr>
       </a:lvl2pPr>
-      <a:lvl3pPr marL="914400" algn="l" defTabSz="457200" rtl="0" eaLnBrk="1" latinLnBrk="0" hangingPunct="1">
+      <a:lvl3pPr marL="914400" algn="l" defTabSz="914400" rtl="0" eaLnBrk="1" latinLnBrk="0" hangingPunct="1">
         <a:defRPr sz="1800" kern="1200">
           <a:solidFill>
             <a:schemeClr val="tx1"/>
@@ -3582,7 +2974,7 @@
           <a:cs typeface="+mn-cs"/>
         </a:defRPr>
       </a:lvl3pPr>
-      <a:lvl4pPr marL="1371600" algn="l" defTabSz="457200" rtl="0" eaLnBrk="1" latinLnBrk="0" hangingPunct="1">
+      <a:lvl4pPr marL="1371600" algn="l" defTabSz="914400" rtl="0" eaLnBrk="1" latinLnBrk="0" hangingPunct="1">
         <a:defRPr sz="1800" kern="1200">
           <a:solidFill>
             <a:schemeClr val="tx1"/>
@@ -3592,7 +2984,7 @@
           <a:cs typeface="+mn-cs"/>
         </a:defRPr>
       </a:lvl4pPr>
-      <a:lvl5pPr marL="1828800" algn="l" defTabSz="457200" rtl="0" eaLnBrk="1" latinLnBrk="0" hangingPunct="1">
+      <a:lvl5pPr marL="1828800" algn="l" defTabSz="914400" rtl="0" eaLnBrk="1" latinLnBrk="0" hangingPunct="1">
         <a:defRPr sz="1800" kern="1200">
           <a:solidFill>
             <a:schemeClr val="tx1"/>
@@ -3602,7 +2994,7 @@
           <a:cs typeface="+mn-cs"/>
         </a:defRPr>
       </a:lvl5pPr>
-      <a:lvl6pPr marL="2286000" algn="l" defTabSz="457200" rtl="0" eaLnBrk="1" latinLnBrk="0" hangingPunct="1">
+      <a:lvl6pPr marL="2286000" algn="l" defTabSz="914400" rtl="0" eaLnBrk="1" latinLnBrk="0" hangingPunct="1">
         <a:defRPr sz="1800" kern="1200">
           <a:solidFill>
             <a:schemeClr val="tx1"/>
@@ -3612,7 +3004,7 @@
           <a:cs typeface="+mn-cs"/>
         </a:defRPr>
       </a:lvl6pPr>
-      <a:lvl7pPr marL="2743200" algn="l" defTabSz="457200" rtl="0" eaLnBrk="1" latinLnBrk="0" hangingPunct="1">
+      <a:lvl7pPr marL="2743200" algn="l" defTabSz="914400" rtl="0" eaLnBrk="1" latinLnBrk="0" hangingPunct="1">
         <a:defRPr sz="1800" kern="1200">
           <a:solidFill>
             <a:schemeClr val="tx1"/>
@@ -3622,7 +3014,7 @@
           <a:cs typeface="+mn-cs"/>
         </a:defRPr>
       </a:lvl7pPr>
-      <a:lvl8pPr marL="3200400" algn="l" defTabSz="457200" rtl="0" eaLnBrk="1" latinLnBrk="0" hangingPunct="1">
+      <a:lvl8pPr marL="3200400" algn="l" defTabSz="914400" rtl="0" eaLnBrk="1" latinLnBrk="0" hangingPunct="1">
         <a:defRPr sz="1800" kern="1200">
           <a:solidFill>
             <a:schemeClr val="tx1"/>
@@ -3632,7 +3024,7 @@
           <a:cs typeface="+mn-cs"/>
         </a:defRPr>
       </a:lvl8pPr>
-      <a:lvl9pPr marL="3657600" algn="l" defTabSz="457200" rtl="0" eaLnBrk="1" latinLnBrk="0" hangingPunct="1">
+      <a:lvl9pPr marL="3657600" algn="l" defTabSz="914400" rtl="0" eaLnBrk="1" latinLnBrk="0" hangingPunct="1">
         <a:defRPr sz="1800" kern="1200">
           <a:solidFill>
             <a:schemeClr val="tx1"/>
@@ -3647,86 +3039,8 @@
 </p:sldMaster>
 </file>
 
-<file path=ppt/slides/slide1.xml><?xml version="1.0" encoding="utf-8"?>
-<p:sld xmlns:a="http://schemas.openxmlformats.org/drawingml/2006/main" xmlns:r="http://schemas.openxmlformats.org/officeDocument/2006/relationships" xmlns:p="http://schemas.openxmlformats.org/presentationml/2006/main">
-  <p:cSld>
-    <p:spTree>
-      <p:nvGrpSpPr>
-        <p:cNvPr id="1" name=""/>
-        <p:cNvGrpSpPr/>
-        <p:nvPr/>
-      </p:nvGrpSpPr>
-      <p:grpSpPr>
-        <a:xfrm>
-          <a:off x="0" y="0"/>
-          <a:ext cx="0" cy="0"/>
-          <a:chOff x="0" y="0"/>
-          <a:chExt cx="0" cy="0"/>
-        </a:xfrm>
-      </p:grpSpPr>
-      <p:sp>
-        <p:nvSpPr>
-          <p:cNvPr id="2049" name="Título 1"/>
-          <p:cNvSpPr>
-            <a:spLocks noGrp="1"/>
-          </p:cNvSpPr>
-          <p:nvPr>
-            <p:ph type="ctrTitle"/>
-          </p:nvPr>
-        </p:nvSpPr>
-        <p:spPr/>
-        <p:txBody>
-          <a:bodyPr/>
-          <a:lstStyle/>
-          <a:p>
-            <a:endParaRPr lang="es-ES">
-              <a:latin typeface="Calibri" charset="0"/>
-            </a:endParaRPr>
-          </a:p>
-        </p:txBody>
-      </p:sp>
-      <p:sp>
-        <p:nvSpPr>
-          <p:cNvPr id="3" name="Subtítulo 2"/>
-          <p:cNvSpPr>
-            <a:spLocks noGrp="1"/>
-          </p:cNvSpPr>
-          <p:nvPr>
-            <p:ph type="subTitle" idx="1"/>
-          </p:nvPr>
-        </p:nvSpPr>
-        <p:spPr/>
-        <p:txBody>
-          <a:bodyPr rtlCol="0">
-            <a:normAutofit/>
-          </a:bodyPr>
-          <a:lstStyle/>
-          <a:p>
-            <a:pPr fontAlgn="auto">
-              <a:spcAft>
-                <a:spcPts val="0"/>
-              </a:spcAft>
-              <a:buFont typeface="Arial"/>
-              <a:buNone/>
-              <a:defRPr/>
-            </a:pPr>
-            <a:endParaRPr lang="es-ES">
-              <a:ea typeface="+mn-ea"/>
-              <a:cs typeface="+mn-cs"/>
-            </a:endParaRPr>
-          </a:p>
-        </p:txBody>
-      </p:sp>
-    </p:spTree>
-  </p:cSld>
-  <p:clrMapOvr>
-    <a:masterClrMapping/>
-  </p:clrMapOvr>
-</p:sld>
-</file>
-
 <file path=ppt/theme/theme1.xml><?xml version="1.0" encoding="utf-8"?>
-<a:theme xmlns:a="http://schemas.openxmlformats.org/drawingml/2006/main" name="Tema de Office">
+<a:theme xmlns:a="http://schemas.openxmlformats.org/drawingml/2006/main" name="Office Theme">
   <a:themeElements>
     <a:clrScheme name="Office">
       <a:dk1>
@@ -3800,7 +3114,6 @@
         <a:font script="Mong" typeface="Mongolian Baiti"/>
         <a:font script="Viet" typeface="Times New Roman"/>
         <a:font script="Uigh" typeface="Microsoft Uighur"/>
-        <a:font script="Geor" typeface="Sylfaen"/>
       </a:majorFont>
       <a:minorFont>
         <a:latin typeface="Calibri"/>
@@ -3835,7 +3148,6 @@
         <a:font script="Mong" typeface="Mongolian Baiti"/>
         <a:font script="Viet" typeface="Arial"/>
         <a:font script="Uigh" typeface="Microsoft Uighur"/>
-        <a:font script="Geor" typeface="Sylfaen"/>
       </a:minorFont>
     </a:fontScheme>
     <a:fmtScheme name="Office">
@@ -3870,16 +3182,20 @@
           <a:gsLst>
             <a:gs pos="0">
               <a:schemeClr val="phClr">
-                <a:tint val="100000"/>
-                <a:shade val="100000"/>
+                <a:shade val="51000"/>
+                <a:satMod val="130000"/>
+              </a:schemeClr>
+            </a:gs>
+            <a:gs pos="80000">
+              <a:schemeClr val="phClr">
+                <a:shade val="93000"/>
                 <a:satMod val="130000"/>
               </a:schemeClr>
             </a:gs>
             <a:gs pos="100000">
               <a:schemeClr val="phClr">
-                <a:tint val="50000"/>
-                <a:shade val="100000"/>
-                <a:satMod val="350000"/>
+                <a:shade val="94000"/>
+                <a:satMod val="135000"/>
               </a:schemeClr>
             </a:gs>
           </a:gsLst>
@@ -4001,46 +3317,7 @@
       </a:bgFillStyleLst>
     </a:fmtScheme>
   </a:themeElements>
-  <a:objectDefaults>
-    <a:spDef>
-      <a:spPr/>
-      <a:bodyPr/>
-      <a:lstStyle/>
-      <a:style>
-        <a:lnRef idx="1">
-          <a:schemeClr val="accent1"/>
-        </a:lnRef>
-        <a:fillRef idx="3">
-          <a:schemeClr val="accent1"/>
-        </a:fillRef>
-        <a:effectRef idx="2">
-          <a:schemeClr val="accent1"/>
-        </a:effectRef>
-        <a:fontRef idx="minor">
-          <a:schemeClr val="lt1"/>
-        </a:fontRef>
-      </a:style>
-    </a:spDef>
-    <a:lnDef>
-      <a:spPr/>
-      <a:bodyPr/>
-      <a:lstStyle/>
-      <a:style>
-        <a:lnRef idx="2">
-          <a:schemeClr val="accent1"/>
-        </a:lnRef>
-        <a:fillRef idx="0">
-          <a:schemeClr val="accent1"/>
-        </a:fillRef>
-        <a:effectRef idx="1">
-          <a:schemeClr val="accent1"/>
-        </a:effectRef>
-        <a:fontRef idx="minor">
-          <a:schemeClr val="tx1"/>
-        </a:fontRef>
-      </a:style>
-    </a:lnDef>
-  </a:objectDefaults>
+  <a:objectDefaults/>
   <a:extraClrSchemeLst/>
 </a:theme>
 </file>
</xml_diff>